<commit_message>
fixed heat map figure and added wgcna figures.
</commit_message>
<xml_diff>
--- a/manuscript/manuscript_figures/heatmap_mainfig.pptx
+++ b/manuscript/manuscript_figures/heatmap_mainfig.pptx
@@ -2,12 +2,12 @@
 <file path=ppt/presentation.xml><?xml version="1.0" encoding="utf-8"?>
 <p:presentation xmlns:a="http://schemas.openxmlformats.org/drawingml/2006/main" xmlns:r="http://schemas.openxmlformats.org/officeDocument/2006/relationships" xmlns:p="http://schemas.openxmlformats.org/presentationml/2006/main" saveSubsetFonts="1" autoCompressPictures="0">
   <p:sldMasterIdLst>
-    <p:sldMasterId id="2147483684" r:id="rId1"/>
+    <p:sldMasterId id="2147483696" r:id="rId1"/>
   </p:sldMasterIdLst>
   <p:sldIdLst>
     <p:sldId id="256" r:id="rId2"/>
   </p:sldIdLst>
-  <p:sldSz cx="13716000" cy="6858000"/>
+  <p:sldSz cx="14630400" cy="6858000"/>
   <p:notesSz cx="6858000" cy="9144000"/>
   <p:defaultTextStyle>
     <a:defPPr>
@@ -116,17 +116,129 @@
 <pc:chgInfo xmlns:a="http://schemas.openxmlformats.org/drawingml/2006/main" xmlns:r="http://schemas.openxmlformats.org/officeDocument/2006/relationships" xmlns:ac="http://schemas.microsoft.com/office/drawing/2013/main/command" xmlns:pc="http://schemas.microsoft.com/office/powerpoint/2013/main/command">
   <pc:docChgLst>
     <pc:chgData name="Tyler Milewski" userId="d8a66fee8314b92f" providerId="LiveId" clId="{ADA63225-3704-4ED7-AB8D-FBA0AB58D6E0}"/>
-    <pc:docChg chg="custSel modSld">
-      <pc:chgData name="Tyler Milewski" userId="d8a66fee8314b92f" providerId="LiveId" clId="{ADA63225-3704-4ED7-AB8D-FBA0AB58D6E0}" dt="2023-12-16T19:05:57.911" v="1" actId="478"/>
+    <pc:docChg chg="undo custSel modSld">
+      <pc:chgData name="Tyler Milewski" userId="d8a66fee8314b92f" providerId="LiveId" clId="{ADA63225-3704-4ED7-AB8D-FBA0AB58D6E0}" dt="2024-01-02T16:07:07.619" v="104" actId="1076"/>
       <pc:docMkLst>
         <pc:docMk/>
       </pc:docMkLst>
-      <pc:sldChg chg="delSp mod">
-        <pc:chgData name="Tyler Milewski" userId="d8a66fee8314b92f" providerId="LiveId" clId="{ADA63225-3704-4ED7-AB8D-FBA0AB58D6E0}" dt="2023-12-16T19:05:57.911" v="1" actId="478"/>
+      <pc:sldChg chg="addSp delSp modSp mod">
+        <pc:chgData name="Tyler Milewski" userId="d8a66fee8314b92f" providerId="LiveId" clId="{ADA63225-3704-4ED7-AB8D-FBA0AB58D6E0}" dt="2024-01-02T16:07:07.619" v="104" actId="1076"/>
         <pc:sldMkLst>
           <pc:docMk/>
           <pc:sldMk cId="221866749" sldId="256"/>
         </pc:sldMkLst>
+        <pc:spChg chg="mod">
+          <ac:chgData name="Tyler Milewski" userId="d8a66fee8314b92f" providerId="LiveId" clId="{ADA63225-3704-4ED7-AB8D-FBA0AB58D6E0}" dt="2024-01-02T16:02:24.680" v="67" actId="571"/>
+          <ac:spMkLst>
+            <pc:docMk/>
+            <pc:sldMk cId="221866749" sldId="256"/>
+            <ac:spMk id="14" creationId="{AC37CBB4-ED4B-E375-9331-68EBD446595B}"/>
+          </ac:spMkLst>
+        </pc:spChg>
+        <pc:spChg chg="mod">
+          <ac:chgData name="Tyler Milewski" userId="d8a66fee8314b92f" providerId="LiveId" clId="{ADA63225-3704-4ED7-AB8D-FBA0AB58D6E0}" dt="2024-01-02T16:02:24.680" v="67" actId="571"/>
+          <ac:spMkLst>
+            <pc:docMk/>
+            <pc:sldMk cId="221866749" sldId="256"/>
+            <ac:spMk id="15" creationId="{9288912F-5C3B-DB39-421B-E253E3C62BF5}"/>
+          </ac:spMkLst>
+        </pc:spChg>
+        <pc:spChg chg="mod">
+          <ac:chgData name="Tyler Milewski" userId="d8a66fee8314b92f" providerId="LiveId" clId="{ADA63225-3704-4ED7-AB8D-FBA0AB58D6E0}" dt="2024-01-02T16:02:24.680" v="67" actId="571"/>
+          <ac:spMkLst>
+            <pc:docMk/>
+            <pc:sldMk cId="221866749" sldId="256"/>
+            <ac:spMk id="16" creationId="{389503B2-E2C5-19B7-A3D7-FB53F40267E7}"/>
+          </ac:spMkLst>
+        </pc:spChg>
+        <pc:spChg chg="mod">
+          <ac:chgData name="Tyler Milewski" userId="d8a66fee8314b92f" providerId="LiveId" clId="{ADA63225-3704-4ED7-AB8D-FBA0AB58D6E0}" dt="2024-01-02T16:02:24.680" v="67" actId="571"/>
+          <ac:spMkLst>
+            <pc:docMk/>
+            <pc:sldMk cId="221866749" sldId="256"/>
+            <ac:spMk id="17" creationId="{01CC8015-9CB3-87A3-5E21-77312D1C0C2B}"/>
+          </ac:spMkLst>
+        </pc:spChg>
+        <pc:spChg chg="mod">
+          <ac:chgData name="Tyler Milewski" userId="d8a66fee8314b92f" providerId="LiveId" clId="{ADA63225-3704-4ED7-AB8D-FBA0AB58D6E0}" dt="2024-01-02T16:02:05.030" v="62" actId="164"/>
+          <ac:spMkLst>
+            <pc:docMk/>
+            <pc:sldMk cId="221866749" sldId="256"/>
+            <ac:spMk id="147" creationId="{1FB90628-16D8-1BE2-D13B-F8491AED6AF9}"/>
+          </ac:spMkLst>
+        </pc:spChg>
+        <pc:spChg chg="mod">
+          <ac:chgData name="Tyler Milewski" userId="d8a66fee8314b92f" providerId="LiveId" clId="{ADA63225-3704-4ED7-AB8D-FBA0AB58D6E0}" dt="2024-01-02T16:02:05.030" v="62" actId="164"/>
+          <ac:spMkLst>
+            <pc:docMk/>
+            <pc:sldMk cId="221866749" sldId="256"/>
+            <ac:spMk id="148" creationId="{FB770CE7-813D-7BDB-5870-E6F8D68C4E28}"/>
+          </ac:spMkLst>
+        </pc:spChg>
+        <pc:spChg chg="mod">
+          <ac:chgData name="Tyler Milewski" userId="d8a66fee8314b92f" providerId="LiveId" clId="{ADA63225-3704-4ED7-AB8D-FBA0AB58D6E0}" dt="2024-01-02T16:02:05.030" v="62" actId="164"/>
+          <ac:spMkLst>
+            <pc:docMk/>
+            <pc:sldMk cId="221866749" sldId="256"/>
+            <ac:spMk id="149" creationId="{C7ED245F-B33B-CA7E-F51E-5D59E3E20079}"/>
+          </ac:spMkLst>
+        </pc:spChg>
+        <pc:spChg chg="mod">
+          <ac:chgData name="Tyler Milewski" userId="d8a66fee8314b92f" providerId="LiveId" clId="{ADA63225-3704-4ED7-AB8D-FBA0AB58D6E0}" dt="2024-01-02T16:02:05.030" v="62" actId="164"/>
+          <ac:spMkLst>
+            <pc:docMk/>
+            <pc:sldMk cId="221866749" sldId="256"/>
+            <ac:spMk id="150" creationId="{1C0127A3-71DD-B8F8-640D-1AB24EA41E9F}"/>
+          </ac:spMkLst>
+        </pc:spChg>
+        <pc:spChg chg="mod">
+          <ac:chgData name="Tyler Milewski" userId="d8a66fee8314b92f" providerId="LiveId" clId="{ADA63225-3704-4ED7-AB8D-FBA0AB58D6E0}" dt="2024-01-02T16:00:17.404" v="26" actId="165"/>
+          <ac:spMkLst>
+            <pc:docMk/>
+            <pc:sldMk cId="221866749" sldId="256"/>
+            <ac:spMk id="175" creationId="{8EA8E13E-C71C-688A-598A-CA2473CE94C1}"/>
+          </ac:spMkLst>
+        </pc:spChg>
+        <pc:spChg chg="mod">
+          <ac:chgData name="Tyler Milewski" userId="d8a66fee8314b92f" providerId="LiveId" clId="{ADA63225-3704-4ED7-AB8D-FBA0AB58D6E0}" dt="2024-01-02T16:00:17.404" v="26" actId="165"/>
+          <ac:spMkLst>
+            <pc:docMk/>
+            <pc:sldMk cId="221866749" sldId="256"/>
+            <ac:spMk id="176" creationId="{916D6B3D-F047-D814-5F1E-B460A371E3EE}"/>
+          </ac:spMkLst>
+        </pc:spChg>
+        <pc:spChg chg="mod">
+          <ac:chgData name="Tyler Milewski" userId="d8a66fee8314b92f" providerId="LiveId" clId="{ADA63225-3704-4ED7-AB8D-FBA0AB58D6E0}" dt="2024-01-02T16:00:17.404" v="26" actId="165"/>
+          <ac:spMkLst>
+            <pc:docMk/>
+            <pc:sldMk cId="221866749" sldId="256"/>
+            <ac:spMk id="177" creationId="{C9A7B1DF-4E15-0538-8547-D9EF9EA42949}"/>
+          </ac:spMkLst>
+        </pc:spChg>
+        <pc:spChg chg="mod">
+          <ac:chgData name="Tyler Milewski" userId="d8a66fee8314b92f" providerId="LiveId" clId="{ADA63225-3704-4ED7-AB8D-FBA0AB58D6E0}" dt="2024-01-02T16:00:17.404" v="26" actId="165"/>
+          <ac:spMkLst>
+            <pc:docMk/>
+            <pc:sldMk cId="221866749" sldId="256"/>
+            <ac:spMk id="178" creationId="{A1673843-B946-2EF6-8FBE-F3CD9C0AB463}"/>
+          </ac:spMkLst>
+        </pc:spChg>
+        <pc:spChg chg="mod">
+          <ac:chgData name="Tyler Milewski" userId="d8a66fee8314b92f" providerId="LiveId" clId="{ADA63225-3704-4ED7-AB8D-FBA0AB58D6E0}" dt="2024-01-02T16:04:55.405" v="91" actId="164"/>
+          <ac:spMkLst>
+            <pc:docMk/>
+            <pc:sldMk cId="221866749" sldId="256"/>
+            <ac:spMk id="195" creationId="{6A8B9CB4-8E31-A9DC-FE01-5F6878C3230A}"/>
+          </ac:spMkLst>
+        </pc:spChg>
+        <pc:spChg chg="mod">
+          <ac:chgData name="Tyler Milewski" userId="d8a66fee8314b92f" providerId="LiveId" clId="{ADA63225-3704-4ED7-AB8D-FBA0AB58D6E0}" dt="2024-01-02T16:05:01.054" v="93" actId="164"/>
+          <ac:spMkLst>
+            <pc:docMk/>
+            <pc:sldMk cId="221866749" sldId="256"/>
+            <ac:spMk id="196" creationId="{45A3813A-FA71-9F84-1239-90C3343244E7}"/>
+          </ac:spMkLst>
+        </pc:spChg>
         <pc:spChg chg="del">
           <ac:chgData name="Tyler Milewski" userId="d8a66fee8314b92f" providerId="LiveId" clId="{ADA63225-3704-4ED7-AB8D-FBA0AB58D6E0}" dt="2023-12-16T19:05:57.911" v="1" actId="478"/>
           <ac:spMkLst>
@@ -135,6 +247,238 @@
             <ac:spMk id="198" creationId="{C100156E-542C-D412-A8D5-56CD93F5D6F7}"/>
           </ac:spMkLst>
         </pc:spChg>
+        <pc:grpChg chg="add mod">
+          <ac:chgData name="Tyler Milewski" userId="d8a66fee8314b92f" providerId="LiveId" clId="{ADA63225-3704-4ED7-AB8D-FBA0AB58D6E0}" dt="2024-01-02T16:02:05.030" v="62" actId="164"/>
+          <ac:grpSpMkLst>
+            <pc:docMk/>
+            <pc:sldMk cId="221866749" sldId="256"/>
+            <ac:grpSpMk id="8" creationId="{72A38980-4A09-FB9E-F58F-C2572875FC1B}"/>
+          </ac:grpSpMkLst>
+        </pc:grpChg>
+        <pc:grpChg chg="add mod">
+          <ac:chgData name="Tyler Milewski" userId="d8a66fee8314b92f" providerId="LiveId" clId="{ADA63225-3704-4ED7-AB8D-FBA0AB58D6E0}" dt="2024-01-02T16:04:55.405" v="91" actId="164"/>
+          <ac:grpSpMkLst>
+            <pc:docMk/>
+            <pc:sldMk cId="221866749" sldId="256"/>
+            <ac:grpSpMk id="9" creationId="{A162EAEB-919F-D8D4-41C4-C03A0B9BA769}"/>
+          </ac:grpSpMkLst>
+        </pc:grpChg>
+        <pc:grpChg chg="add mod">
+          <ac:chgData name="Tyler Milewski" userId="d8a66fee8314b92f" providerId="LiveId" clId="{ADA63225-3704-4ED7-AB8D-FBA0AB58D6E0}" dt="2024-01-02T16:02:24.680" v="67" actId="571"/>
+          <ac:grpSpMkLst>
+            <pc:docMk/>
+            <pc:sldMk cId="221866749" sldId="256"/>
+            <ac:grpSpMk id="11" creationId="{00DC6C5D-6BE5-7155-A9FE-41A2C9659415}"/>
+          </ac:grpSpMkLst>
+        </pc:grpChg>
+        <pc:grpChg chg="mod">
+          <ac:chgData name="Tyler Milewski" userId="d8a66fee8314b92f" providerId="LiveId" clId="{ADA63225-3704-4ED7-AB8D-FBA0AB58D6E0}" dt="2024-01-02T16:02:24.680" v="67" actId="571"/>
+          <ac:grpSpMkLst>
+            <pc:docMk/>
+            <pc:sldMk cId="221866749" sldId="256"/>
+            <ac:grpSpMk id="12" creationId="{9D4CAA11-5290-77A7-2914-2E28DFF45FF9}"/>
+          </ac:grpSpMkLst>
+        </pc:grpChg>
+        <pc:grpChg chg="mod">
+          <ac:chgData name="Tyler Milewski" userId="d8a66fee8314b92f" providerId="LiveId" clId="{ADA63225-3704-4ED7-AB8D-FBA0AB58D6E0}" dt="2024-01-02T16:02:24.680" v="67" actId="571"/>
+          <ac:grpSpMkLst>
+            <pc:docMk/>
+            <pc:sldMk cId="221866749" sldId="256"/>
+            <ac:grpSpMk id="13" creationId="{19626195-93B2-C8A2-6D50-BC44DDBFB63F}"/>
+          </ac:grpSpMkLst>
+        </pc:grpChg>
+        <pc:grpChg chg="mod">
+          <ac:chgData name="Tyler Milewski" userId="d8a66fee8314b92f" providerId="LiveId" clId="{ADA63225-3704-4ED7-AB8D-FBA0AB58D6E0}" dt="2024-01-02T16:02:24.680" v="67" actId="571"/>
+          <ac:grpSpMkLst>
+            <pc:docMk/>
+            <pc:sldMk cId="221866749" sldId="256"/>
+            <ac:grpSpMk id="19" creationId="{C6BD6B95-001E-0B4B-1D20-F207DF1B3C35}"/>
+          </ac:grpSpMkLst>
+        </pc:grpChg>
+        <pc:grpChg chg="mod">
+          <ac:chgData name="Tyler Milewski" userId="d8a66fee8314b92f" providerId="LiveId" clId="{ADA63225-3704-4ED7-AB8D-FBA0AB58D6E0}" dt="2024-01-02T16:02:24.680" v="67" actId="571"/>
+          <ac:grpSpMkLst>
+            <pc:docMk/>
+            <pc:sldMk cId="221866749" sldId="256"/>
+            <ac:grpSpMk id="26" creationId="{EA82A7F3-E8B0-9F57-9146-C3D705B13AEF}"/>
+          </ac:grpSpMkLst>
+        </pc:grpChg>
+        <pc:grpChg chg="add mod">
+          <ac:chgData name="Tyler Milewski" userId="d8a66fee8314b92f" providerId="LiveId" clId="{ADA63225-3704-4ED7-AB8D-FBA0AB58D6E0}" dt="2024-01-02T16:05:01.054" v="93" actId="164"/>
+          <ac:grpSpMkLst>
+            <pc:docMk/>
+            <pc:sldMk cId="221866749" sldId="256"/>
+            <ac:grpSpMk id="35" creationId="{C2B815F7-10A8-6F79-6655-BD9A8FF08AB8}"/>
+          </ac:grpSpMkLst>
+        </pc:grpChg>
+        <pc:grpChg chg="add mod">
+          <ac:chgData name="Tyler Milewski" userId="d8a66fee8314b92f" providerId="LiveId" clId="{ADA63225-3704-4ED7-AB8D-FBA0AB58D6E0}" dt="2024-01-02T16:07:03.646" v="103" actId="1076"/>
+          <ac:grpSpMkLst>
+            <pc:docMk/>
+            <pc:sldMk cId="221866749" sldId="256"/>
+            <ac:grpSpMk id="37" creationId="{A64C00C1-1832-C45B-1500-67951A687F17}"/>
+          </ac:grpSpMkLst>
+        </pc:grpChg>
+        <pc:grpChg chg="add mod">
+          <ac:chgData name="Tyler Milewski" userId="d8a66fee8314b92f" providerId="LiveId" clId="{ADA63225-3704-4ED7-AB8D-FBA0AB58D6E0}" dt="2024-01-02T16:06:56.867" v="102" actId="1076"/>
+          <ac:grpSpMkLst>
+            <pc:docMk/>
+            <pc:sldMk cId="221866749" sldId="256"/>
+            <ac:grpSpMk id="38" creationId="{AE09E66A-E5E1-FF19-8E9D-67AC9E85B8A1}"/>
+          </ac:grpSpMkLst>
+        </pc:grpChg>
+        <pc:grpChg chg="mod">
+          <ac:chgData name="Tyler Milewski" userId="d8a66fee8314b92f" providerId="LiveId" clId="{ADA63225-3704-4ED7-AB8D-FBA0AB58D6E0}" dt="2024-01-02T16:02:05.030" v="62" actId="164"/>
+          <ac:grpSpMkLst>
+            <pc:docMk/>
+            <pc:sldMk cId="221866749" sldId="256"/>
+            <ac:grpSpMk id="131" creationId="{0BCD7190-3696-7E16-B8DC-B04A861CE343}"/>
+          </ac:grpSpMkLst>
+        </pc:grpChg>
+        <pc:grpChg chg="mod">
+          <ac:chgData name="Tyler Milewski" userId="d8a66fee8314b92f" providerId="LiveId" clId="{ADA63225-3704-4ED7-AB8D-FBA0AB58D6E0}" dt="2024-01-02T16:02:05.030" v="62" actId="164"/>
+          <ac:grpSpMkLst>
+            <pc:docMk/>
+            <pc:sldMk cId="221866749" sldId="256"/>
+            <ac:grpSpMk id="138" creationId="{DB2DD103-2A94-70B8-48A9-6A7ED7AE6C31}"/>
+          </ac:grpSpMkLst>
+        </pc:grpChg>
+        <pc:grpChg chg="mod">
+          <ac:chgData name="Tyler Milewski" userId="d8a66fee8314b92f" providerId="LiveId" clId="{ADA63225-3704-4ED7-AB8D-FBA0AB58D6E0}" dt="2024-01-02T16:02:05.030" v="62" actId="164"/>
+          <ac:grpSpMkLst>
+            <pc:docMk/>
+            <pc:sldMk cId="221866749" sldId="256"/>
+            <ac:grpSpMk id="139" creationId="{CC4EECA2-E59D-E21E-EC79-855249EA385F}"/>
+          </ac:grpSpMkLst>
+        </pc:grpChg>
+        <pc:grpChg chg="mod">
+          <ac:chgData name="Tyler Milewski" userId="d8a66fee8314b92f" providerId="LiveId" clId="{ADA63225-3704-4ED7-AB8D-FBA0AB58D6E0}" dt="2024-01-02T16:02:05.030" v="62" actId="164"/>
+          <ac:grpSpMkLst>
+            <pc:docMk/>
+            <pc:sldMk cId="221866749" sldId="256"/>
+            <ac:grpSpMk id="141" creationId="{1198DCC4-17D8-51D6-8D3C-DB22D59558A4}"/>
+          </ac:grpSpMkLst>
+        </pc:grpChg>
+        <pc:grpChg chg="mod topLvl">
+          <ac:chgData name="Tyler Milewski" userId="d8a66fee8314b92f" providerId="LiveId" clId="{ADA63225-3704-4ED7-AB8D-FBA0AB58D6E0}" dt="2024-01-02T16:02:08.186" v="63" actId="164"/>
+          <ac:grpSpMkLst>
+            <pc:docMk/>
+            <pc:sldMk cId="221866749" sldId="256"/>
+            <ac:grpSpMk id="171" creationId="{95527DFA-BE3E-2D08-51A1-2C090F549B6D}"/>
+          </ac:grpSpMkLst>
+        </pc:grpChg>
+        <pc:grpChg chg="mod topLvl">
+          <ac:chgData name="Tyler Milewski" userId="d8a66fee8314b92f" providerId="LiveId" clId="{ADA63225-3704-4ED7-AB8D-FBA0AB58D6E0}" dt="2024-01-02T16:02:37.222" v="72" actId="164"/>
+          <ac:grpSpMkLst>
+            <pc:docMk/>
+            <pc:sldMk cId="221866749" sldId="256"/>
+            <ac:grpSpMk id="172" creationId="{A280A489-3BD4-332C-74B1-1B1BE94314F6}"/>
+          </ac:grpSpMkLst>
+        </pc:grpChg>
+        <pc:grpChg chg="mod">
+          <ac:chgData name="Tyler Milewski" userId="d8a66fee8314b92f" providerId="LiveId" clId="{ADA63225-3704-4ED7-AB8D-FBA0AB58D6E0}" dt="2024-01-02T16:00:17.404" v="26" actId="165"/>
+          <ac:grpSpMkLst>
+            <pc:docMk/>
+            <pc:sldMk cId="221866749" sldId="256"/>
+            <ac:grpSpMk id="173" creationId="{CD6747E6-A769-CBE6-0F36-53D3D190D37A}"/>
+          </ac:grpSpMkLst>
+        </pc:grpChg>
+        <pc:grpChg chg="mod">
+          <ac:chgData name="Tyler Milewski" userId="d8a66fee8314b92f" providerId="LiveId" clId="{ADA63225-3704-4ED7-AB8D-FBA0AB58D6E0}" dt="2024-01-02T16:00:17.404" v="26" actId="165"/>
+          <ac:grpSpMkLst>
+            <pc:docMk/>
+            <pc:sldMk cId="221866749" sldId="256"/>
+            <ac:grpSpMk id="174" creationId="{BAE06BA9-E31B-CAE9-E2AE-8D2BEDCC8F2B}"/>
+          </ac:grpSpMkLst>
+        </pc:grpChg>
+        <pc:grpChg chg="mod">
+          <ac:chgData name="Tyler Milewski" userId="d8a66fee8314b92f" providerId="LiveId" clId="{ADA63225-3704-4ED7-AB8D-FBA0AB58D6E0}" dt="2024-01-02T16:00:17.404" v="26" actId="165"/>
+          <ac:grpSpMkLst>
+            <pc:docMk/>
+            <pc:sldMk cId="221866749" sldId="256"/>
+            <ac:grpSpMk id="180" creationId="{7BAD018B-231F-8891-28AB-B5D248D1F820}"/>
+          </ac:grpSpMkLst>
+        </pc:grpChg>
+        <pc:grpChg chg="mod">
+          <ac:chgData name="Tyler Milewski" userId="d8a66fee8314b92f" providerId="LiveId" clId="{ADA63225-3704-4ED7-AB8D-FBA0AB58D6E0}" dt="2024-01-02T16:00:17.404" v="26" actId="165"/>
+          <ac:grpSpMkLst>
+            <pc:docMk/>
+            <pc:sldMk cId="221866749" sldId="256"/>
+            <ac:grpSpMk id="187" creationId="{0E48CBE7-28DD-3996-E9FD-48617922D45D}"/>
+          </ac:grpSpMkLst>
+        </pc:grpChg>
+        <pc:grpChg chg="del mod">
+          <ac:chgData name="Tyler Milewski" userId="d8a66fee8314b92f" providerId="LiveId" clId="{ADA63225-3704-4ED7-AB8D-FBA0AB58D6E0}" dt="2024-01-02T16:00:17.404" v="26" actId="165"/>
+          <ac:grpSpMkLst>
+            <pc:docMk/>
+            <pc:sldMk cId="221866749" sldId="256"/>
+            <ac:grpSpMk id="193" creationId="{04652617-BA58-DC85-3B7E-19A56BCA4E6A}"/>
+          </ac:grpSpMkLst>
+        </pc:grpChg>
+        <pc:grpChg chg="add del">
+          <ac:chgData name="Tyler Milewski" userId="d8a66fee8314b92f" providerId="LiveId" clId="{ADA63225-3704-4ED7-AB8D-FBA0AB58D6E0}" dt="2024-01-02T15:55:55.963" v="4" actId="165"/>
+          <ac:grpSpMkLst>
+            <pc:docMk/>
+            <pc:sldMk cId="221866749" sldId="256"/>
+            <ac:grpSpMk id="194" creationId="{6205038D-465E-99EC-B4C3-02612103F22A}"/>
+          </ac:grpSpMkLst>
+        </pc:grpChg>
+        <pc:picChg chg="add del mod ord">
+          <ac:chgData name="Tyler Milewski" userId="d8a66fee8314b92f" providerId="LiveId" clId="{ADA63225-3704-4ED7-AB8D-FBA0AB58D6E0}" dt="2024-01-02T16:00:21.691" v="29" actId="478"/>
+          <ac:picMkLst>
+            <pc:docMk/>
+            <pc:sldMk cId="221866749" sldId="256"/>
+            <ac:picMk id="3" creationId="{435C6854-2FC4-CB99-CE93-F3C2D4924B97}"/>
+          </ac:picMkLst>
+        </pc:picChg>
+        <pc:picChg chg="add mod ord">
+          <ac:chgData name="Tyler Milewski" userId="d8a66fee8314b92f" providerId="LiveId" clId="{ADA63225-3704-4ED7-AB8D-FBA0AB58D6E0}" dt="2024-01-02T16:02:08.186" v="63" actId="164"/>
+          <ac:picMkLst>
+            <pc:docMk/>
+            <pc:sldMk cId="221866749" sldId="256"/>
+            <ac:picMk id="5" creationId="{63447E14-8BD5-3EC5-9F6C-92D97251C924}"/>
+          </ac:picMkLst>
+        </pc:picChg>
+        <pc:picChg chg="add mod ord">
+          <ac:chgData name="Tyler Milewski" userId="d8a66fee8314b92f" providerId="LiveId" clId="{ADA63225-3704-4ED7-AB8D-FBA0AB58D6E0}" dt="2024-01-02T16:02:37.222" v="72" actId="164"/>
+          <ac:picMkLst>
+            <pc:docMk/>
+            <pc:sldMk cId="221866749" sldId="256"/>
+            <ac:picMk id="7" creationId="{17CB3543-FFB0-E8CD-26E2-E443F27D3BFB}"/>
+          </ac:picMkLst>
+        </pc:picChg>
+        <pc:picChg chg="add mod">
+          <ac:chgData name="Tyler Milewski" userId="d8a66fee8314b92f" providerId="LiveId" clId="{ADA63225-3704-4ED7-AB8D-FBA0AB58D6E0}" dt="2024-01-02T16:02:24.680" v="67" actId="571"/>
+          <ac:picMkLst>
+            <pc:docMk/>
+            <pc:sldMk cId="221866749" sldId="256"/>
+            <ac:picMk id="10" creationId="{0E28A0D7-1BD8-7085-859B-0B35C5B894F0}"/>
+          </ac:picMkLst>
+        </pc:picChg>
+        <pc:picChg chg="add mod ord modCrop">
+          <ac:chgData name="Tyler Milewski" userId="d8a66fee8314b92f" providerId="LiveId" clId="{ADA63225-3704-4ED7-AB8D-FBA0AB58D6E0}" dt="2024-01-02T16:07:07.619" v="104" actId="1076"/>
+          <ac:picMkLst>
+            <pc:docMk/>
+            <pc:sldMk cId="221866749" sldId="256"/>
+            <ac:picMk id="36" creationId="{3CDF9158-121F-62E1-7079-3F9100AA0629}"/>
+          </ac:picMkLst>
+        </pc:picChg>
+        <pc:picChg chg="del mod topLvl">
+          <ac:chgData name="Tyler Milewski" userId="d8a66fee8314b92f" providerId="LiveId" clId="{ADA63225-3704-4ED7-AB8D-FBA0AB58D6E0}" dt="2024-01-02T16:00:20.802" v="28" actId="478"/>
+          <ac:picMkLst>
+            <pc:docMk/>
+            <pc:sldMk cId="221866749" sldId="256"/>
+            <ac:picMk id="106" creationId="{F2A05DD9-5DA3-8A8C-95FF-8D26EEDAF9E1}"/>
+          </ac:picMkLst>
+        </pc:picChg>
+        <pc:picChg chg="del mod topLvl">
+          <ac:chgData name="Tyler Milewski" userId="d8a66fee8314b92f" providerId="LiveId" clId="{ADA63225-3704-4ED7-AB8D-FBA0AB58D6E0}" dt="2024-01-02T15:56:02.915" v="5" actId="478"/>
+          <ac:picMkLst>
+            <pc:docMk/>
+            <pc:sldMk cId="221866749" sldId="256"/>
+            <ac:picMk id="118" creationId="{33CF2442-9D6B-34C2-BE84-876E7AC71A53}"/>
+          </ac:picMkLst>
+        </pc:picChg>
         <pc:picChg chg="del">
           <ac:chgData name="Tyler Milewski" userId="d8a66fee8314b92f" providerId="LiveId" clId="{ADA63225-3704-4ED7-AB8D-FBA0AB58D6E0}" dt="2023-12-16T19:05:53.883" v="0" actId="478"/>
           <ac:picMkLst>
@@ -143,6 +487,294 @@
             <ac:picMk id="208" creationId="{4139F6D4-7CAC-1296-0C38-D625811A39D1}"/>
           </ac:picMkLst>
         </pc:picChg>
+        <pc:cxnChg chg="mod">
+          <ac:chgData name="Tyler Milewski" userId="d8a66fee8314b92f" providerId="LiveId" clId="{ADA63225-3704-4ED7-AB8D-FBA0AB58D6E0}" dt="2024-01-02T16:02:24.680" v="67" actId="571"/>
+          <ac:cxnSpMkLst>
+            <pc:docMk/>
+            <pc:sldMk cId="221866749" sldId="256"/>
+            <ac:cxnSpMk id="18" creationId="{C03420B1-74DC-891E-DC6C-B62364BA276D}"/>
+          </ac:cxnSpMkLst>
+        </pc:cxnChg>
+        <pc:cxnChg chg="mod">
+          <ac:chgData name="Tyler Milewski" userId="d8a66fee8314b92f" providerId="LiveId" clId="{ADA63225-3704-4ED7-AB8D-FBA0AB58D6E0}" dt="2024-01-02T16:02:24.680" v="67" actId="571"/>
+          <ac:cxnSpMkLst>
+            <pc:docMk/>
+            <pc:sldMk cId="221866749" sldId="256"/>
+            <ac:cxnSpMk id="20" creationId="{DE301375-FCC4-520A-8F89-EC625B076919}"/>
+          </ac:cxnSpMkLst>
+        </pc:cxnChg>
+        <pc:cxnChg chg="mod">
+          <ac:chgData name="Tyler Milewski" userId="d8a66fee8314b92f" providerId="LiveId" clId="{ADA63225-3704-4ED7-AB8D-FBA0AB58D6E0}" dt="2024-01-02T16:02:24.680" v="67" actId="571"/>
+          <ac:cxnSpMkLst>
+            <pc:docMk/>
+            <pc:sldMk cId="221866749" sldId="256"/>
+            <ac:cxnSpMk id="21" creationId="{E87CF263-9467-C534-BCA3-FDF8FC566560}"/>
+          </ac:cxnSpMkLst>
+        </pc:cxnChg>
+        <pc:cxnChg chg="mod">
+          <ac:chgData name="Tyler Milewski" userId="d8a66fee8314b92f" providerId="LiveId" clId="{ADA63225-3704-4ED7-AB8D-FBA0AB58D6E0}" dt="2024-01-02T16:02:24.680" v="67" actId="571"/>
+          <ac:cxnSpMkLst>
+            <pc:docMk/>
+            <pc:sldMk cId="221866749" sldId="256"/>
+            <ac:cxnSpMk id="22" creationId="{808AD840-DDD6-3A78-5D09-9A38700C548E}"/>
+          </ac:cxnSpMkLst>
+        </pc:cxnChg>
+        <pc:cxnChg chg="mod">
+          <ac:chgData name="Tyler Milewski" userId="d8a66fee8314b92f" providerId="LiveId" clId="{ADA63225-3704-4ED7-AB8D-FBA0AB58D6E0}" dt="2024-01-02T16:02:24.680" v="67" actId="571"/>
+          <ac:cxnSpMkLst>
+            <pc:docMk/>
+            <pc:sldMk cId="221866749" sldId="256"/>
+            <ac:cxnSpMk id="23" creationId="{98480734-C0C8-FFF0-F03C-771C390DC831}"/>
+          </ac:cxnSpMkLst>
+        </pc:cxnChg>
+        <pc:cxnChg chg="mod">
+          <ac:chgData name="Tyler Milewski" userId="d8a66fee8314b92f" providerId="LiveId" clId="{ADA63225-3704-4ED7-AB8D-FBA0AB58D6E0}" dt="2024-01-02T16:02:24.680" v="67" actId="571"/>
+          <ac:cxnSpMkLst>
+            <pc:docMk/>
+            <pc:sldMk cId="221866749" sldId="256"/>
+            <ac:cxnSpMk id="24" creationId="{A5D10175-E33A-D8F3-FAA7-79F569909948}"/>
+          </ac:cxnSpMkLst>
+        </pc:cxnChg>
+        <pc:cxnChg chg="mod">
+          <ac:chgData name="Tyler Milewski" userId="d8a66fee8314b92f" providerId="LiveId" clId="{ADA63225-3704-4ED7-AB8D-FBA0AB58D6E0}" dt="2024-01-02T16:02:24.680" v="67" actId="571"/>
+          <ac:cxnSpMkLst>
+            <pc:docMk/>
+            <pc:sldMk cId="221866749" sldId="256"/>
+            <ac:cxnSpMk id="25" creationId="{3D68A7A7-8C43-EE62-97A1-DF85CDBC7782}"/>
+          </ac:cxnSpMkLst>
+        </pc:cxnChg>
+        <pc:cxnChg chg="mod">
+          <ac:chgData name="Tyler Milewski" userId="d8a66fee8314b92f" providerId="LiveId" clId="{ADA63225-3704-4ED7-AB8D-FBA0AB58D6E0}" dt="2024-01-02T16:02:05.030" v="62" actId="164"/>
+          <ac:cxnSpMkLst>
+            <pc:docMk/>
+            <pc:sldMk cId="221866749" sldId="256"/>
+            <ac:cxnSpMk id="27" creationId="{0124E632-8D9E-9F6E-07EA-6F32569E3758}"/>
+          </ac:cxnSpMkLst>
+        </pc:cxnChg>
+        <pc:cxnChg chg="mod">
+          <ac:chgData name="Tyler Milewski" userId="d8a66fee8314b92f" providerId="LiveId" clId="{ADA63225-3704-4ED7-AB8D-FBA0AB58D6E0}" dt="2024-01-02T16:02:05.030" v="62" actId="164"/>
+          <ac:cxnSpMkLst>
+            <pc:docMk/>
+            <pc:sldMk cId="221866749" sldId="256"/>
+            <ac:cxnSpMk id="28" creationId="{9F01D024-0A4F-A0EC-F9F8-5E14C6AF2D1B}"/>
+          </ac:cxnSpMkLst>
+        </pc:cxnChg>
+        <pc:cxnChg chg="mod">
+          <ac:chgData name="Tyler Milewski" userId="d8a66fee8314b92f" providerId="LiveId" clId="{ADA63225-3704-4ED7-AB8D-FBA0AB58D6E0}" dt="2024-01-02T16:02:24.680" v="67" actId="571"/>
+          <ac:cxnSpMkLst>
+            <pc:docMk/>
+            <pc:sldMk cId="221866749" sldId="256"/>
+            <ac:cxnSpMk id="29" creationId="{E278FF26-E3ED-EFAC-9E6A-F85FE6A736B1}"/>
+          </ac:cxnSpMkLst>
+        </pc:cxnChg>
+        <pc:cxnChg chg="mod">
+          <ac:chgData name="Tyler Milewski" userId="d8a66fee8314b92f" providerId="LiveId" clId="{ADA63225-3704-4ED7-AB8D-FBA0AB58D6E0}" dt="2024-01-02T16:02:05.030" v="62" actId="164"/>
+          <ac:cxnSpMkLst>
+            <pc:docMk/>
+            <pc:sldMk cId="221866749" sldId="256"/>
+            <ac:cxnSpMk id="30" creationId="{E4C311EF-EF85-CAD1-55E0-53CB4A61339B}"/>
+          </ac:cxnSpMkLst>
+        </pc:cxnChg>
+        <pc:cxnChg chg="mod">
+          <ac:chgData name="Tyler Milewski" userId="d8a66fee8314b92f" providerId="LiveId" clId="{ADA63225-3704-4ED7-AB8D-FBA0AB58D6E0}" dt="2024-01-02T16:02:24.680" v="67" actId="571"/>
+          <ac:cxnSpMkLst>
+            <pc:docMk/>
+            <pc:sldMk cId="221866749" sldId="256"/>
+            <ac:cxnSpMk id="31" creationId="{B293A715-1DCE-D05B-2ED4-61DF648429F6}"/>
+          </ac:cxnSpMkLst>
+        </pc:cxnChg>
+        <pc:cxnChg chg="mod">
+          <ac:chgData name="Tyler Milewski" userId="d8a66fee8314b92f" providerId="LiveId" clId="{ADA63225-3704-4ED7-AB8D-FBA0AB58D6E0}" dt="2024-01-02T16:02:24.680" v="67" actId="571"/>
+          <ac:cxnSpMkLst>
+            <pc:docMk/>
+            <pc:sldMk cId="221866749" sldId="256"/>
+            <ac:cxnSpMk id="32" creationId="{6C54D622-F6B7-89DA-9209-5C81C8BF20DE}"/>
+          </ac:cxnSpMkLst>
+        </pc:cxnChg>
+        <pc:cxnChg chg="mod">
+          <ac:chgData name="Tyler Milewski" userId="d8a66fee8314b92f" providerId="LiveId" clId="{ADA63225-3704-4ED7-AB8D-FBA0AB58D6E0}" dt="2024-01-02T16:02:24.680" v="67" actId="571"/>
+          <ac:cxnSpMkLst>
+            <pc:docMk/>
+            <pc:sldMk cId="221866749" sldId="256"/>
+            <ac:cxnSpMk id="33" creationId="{9C150F3A-324A-203B-6B01-65EE150636BE}"/>
+          </ac:cxnSpMkLst>
+        </pc:cxnChg>
+        <pc:cxnChg chg="mod">
+          <ac:chgData name="Tyler Milewski" userId="d8a66fee8314b92f" providerId="LiveId" clId="{ADA63225-3704-4ED7-AB8D-FBA0AB58D6E0}" dt="2024-01-02T16:02:24.680" v="67" actId="571"/>
+          <ac:cxnSpMkLst>
+            <pc:docMk/>
+            <pc:sldMk cId="221866749" sldId="256"/>
+            <ac:cxnSpMk id="34" creationId="{9842CB89-134E-7E89-D96D-E92BC0A71011}"/>
+          </ac:cxnSpMkLst>
+        </pc:cxnChg>
+        <pc:cxnChg chg="mod">
+          <ac:chgData name="Tyler Milewski" userId="d8a66fee8314b92f" providerId="LiveId" clId="{ADA63225-3704-4ED7-AB8D-FBA0AB58D6E0}" dt="2024-01-02T16:02:05.030" v="62" actId="164"/>
+          <ac:cxnSpMkLst>
+            <pc:docMk/>
+            <pc:sldMk cId="221866749" sldId="256"/>
+            <ac:cxnSpMk id="128" creationId="{AC9D6680-9461-A8DD-5270-7ADAE92C23C6}"/>
+          </ac:cxnSpMkLst>
+        </pc:cxnChg>
+        <pc:cxnChg chg="mod">
+          <ac:chgData name="Tyler Milewski" userId="d8a66fee8314b92f" providerId="LiveId" clId="{ADA63225-3704-4ED7-AB8D-FBA0AB58D6E0}" dt="2024-01-02T16:02:05.030" v="62" actId="164"/>
+          <ac:cxnSpMkLst>
+            <pc:docMk/>
+            <pc:sldMk cId="221866749" sldId="256"/>
+            <ac:cxnSpMk id="129" creationId="{F98E4082-B79F-9149-7742-D26765B85EBA}"/>
+          </ac:cxnSpMkLst>
+        </pc:cxnChg>
+        <pc:cxnChg chg="mod">
+          <ac:chgData name="Tyler Milewski" userId="d8a66fee8314b92f" providerId="LiveId" clId="{ADA63225-3704-4ED7-AB8D-FBA0AB58D6E0}" dt="2024-01-02T16:02:05.030" v="62" actId="164"/>
+          <ac:cxnSpMkLst>
+            <pc:docMk/>
+            <pc:sldMk cId="221866749" sldId="256"/>
+            <ac:cxnSpMk id="130" creationId="{6ABF1EB0-90B6-9B44-637C-A9E1841D5EAC}"/>
+          </ac:cxnSpMkLst>
+        </pc:cxnChg>
+        <pc:cxnChg chg="mod">
+          <ac:chgData name="Tyler Milewski" userId="d8a66fee8314b92f" providerId="LiveId" clId="{ADA63225-3704-4ED7-AB8D-FBA0AB58D6E0}" dt="2024-01-02T16:02:05.030" v="62" actId="164"/>
+          <ac:cxnSpMkLst>
+            <pc:docMk/>
+            <pc:sldMk cId="221866749" sldId="256"/>
+            <ac:cxnSpMk id="140" creationId="{914E903E-C21C-E8D6-FE6B-08B21BDC7FE8}"/>
+          </ac:cxnSpMkLst>
+        </pc:cxnChg>
+        <pc:cxnChg chg="mod">
+          <ac:chgData name="Tyler Milewski" userId="d8a66fee8314b92f" providerId="LiveId" clId="{ADA63225-3704-4ED7-AB8D-FBA0AB58D6E0}" dt="2024-01-02T16:02:05.030" v="62" actId="164"/>
+          <ac:cxnSpMkLst>
+            <pc:docMk/>
+            <pc:sldMk cId="221866749" sldId="256"/>
+            <ac:cxnSpMk id="142" creationId="{F85C6D63-5D6F-63A2-A184-A26C157F5DDE}"/>
+          </ac:cxnSpMkLst>
+        </pc:cxnChg>
+        <pc:cxnChg chg="mod">
+          <ac:chgData name="Tyler Milewski" userId="d8a66fee8314b92f" providerId="LiveId" clId="{ADA63225-3704-4ED7-AB8D-FBA0AB58D6E0}" dt="2024-01-02T16:02:05.030" v="62" actId="164"/>
+          <ac:cxnSpMkLst>
+            <pc:docMk/>
+            <pc:sldMk cId="221866749" sldId="256"/>
+            <ac:cxnSpMk id="143" creationId="{669617AA-A084-43C6-B65E-8FA791154028}"/>
+          </ac:cxnSpMkLst>
+        </pc:cxnChg>
+        <pc:cxnChg chg="mod">
+          <ac:chgData name="Tyler Milewski" userId="d8a66fee8314b92f" providerId="LiveId" clId="{ADA63225-3704-4ED7-AB8D-FBA0AB58D6E0}" dt="2024-01-02T16:02:05.030" v="62" actId="164"/>
+          <ac:cxnSpMkLst>
+            <pc:docMk/>
+            <pc:sldMk cId="221866749" sldId="256"/>
+            <ac:cxnSpMk id="144" creationId="{AC40BDD6-48DD-53A1-3058-22362890BCF3}"/>
+          </ac:cxnSpMkLst>
+        </pc:cxnChg>
+        <pc:cxnChg chg="mod">
+          <ac:chgData name="Tyler Milewski" userId="d8a66fee8314b92f" providerId="LiveId" clId="{ADA63225-3704-4ED7-AB8D-FBA0AB58D6E0}" dt="2024-01-02T16:02:05.030" v="62" actId="164"/>
+          <ac:cxnSpMkLst>
+            <pc:docMk/>
+            <pc:sldMk cId="221866749" sldId="256"/>
+            <ac:cxnSpMk id="145" creationId="{A5E7BC6B-F9B5-1768-5E0C-631D9E44D16A}"/>
+          </ac:cxnSpMkLst>
+        </pc:cxnChg>
+        <pc:cxnChg chg="mod">
+          <ac:chgData name="Tyler Milewski" userId="d8a66fee8314b92f" providerId="LiveId" clId="{ADA63225-3704-4ED7-AB8D-FBA0AB58D6E0}" dt="2024-01-02T16:02:05.030" v="62" actId="164"/>
+          <ac:cxnSpMkLst>
+            <pc:docMk/>
+            <pc:sldMk cId="221866749" sldId="256"/>
+            <ac:cxnSpMk id="146" creationId="{24C2CF73-9275-EBF2-74A1-7CDE647A4821}"/>
+          </ac:cxnSpMkLst>
+        </pc:cxnChg>
+        <pc:cxnChg chg="mod">
+          <ac:chgData name="Tyler Milewski" userId="d8a66fee8314b92f" providerId="LiveId" clId="{ADA63225-3704-4ED7-AB8D-FBA0AB58D6E0}" dt="2024-01-02T16:00:17.404" v="26" actId="165"/>
+          <ac:cxnSpMkLst>
+            <pc:docMk/>
+            <pc:sldMk cId="221866749" sldId="256"/>
+            <ac:cxnSpMk id="179" creationId="{EA926576-B469-ED55-6113-912235919604}"/>
+          </ac:cxnSpMkLst>
+        </pc:cxnChg>
+        <pc:cxnChg chg="mod">
+          <ac:chgData name="Tyler Milewski" userId="d8a66fee8314b92f" providerId="LiveId" clId="{ADA63225-3704-4ED7-AB8D-FBA0AB58D6E0}" dt="2024-01-02T16:00:17.404" v="26" actId="165"/>
+          <ac:cxnSpMkLst>
+            <pc:docMk/>
+            <pc:sldMk cId="221866749" sldId="256"/>
+            <ac:cxnSpMk id="181" creationId="{FA8CE078-23F2-AA73-46E9-D77161EA196E}"/>
+          </ac:cxnSpMkLst>
+        </pc:cxnChg>
+        <pc:cxnChg chg="mod">
+          <ac:chgData name="Tyler Milewski" userId="d8a66fee8314b92f" providerId="LiveId" clId="{ADA63225-3704-4ED7-AB8D-FBA0AB58D6E0}" dt="2024-01-02T16:00:17.404" v="26" actId="165"/>
+          <ac:cxnSpMkLst>
+            <pc:docMk/>
+            <pc:sldMk cId="221866749" sldId="256"/>
+            <ac:cxnSpMk id="182" creationId="{8F96963A-B0DC-13C0-2AA4-DC0BFA1333F8}"/>
+          </ac:cxnSpMkLst>
+        </pc:cxnChg>
+        <pc:cxnChg chg="mod">
+          <ac:chgData name="Tyler Milewski" userId="d8a66fee8314b92f" providerId="LiveId" clId="{ADA63225-3704-4ED7-AB8D-FBA0AB58D6E0}" dt="2024-01-02T16:00:17.404" v="26" actId="165"/>
+          <ac:cxnSpMkLst>
+            <pc:docMk/>
+            <pc:sldMk cId="221866749" sldId="256"/>
+            <ac:cxnSpMk id="183" creationId="{6DD69843-CDA2-4EA3-8B1E-0F4469BA6A49}"/>
+          </ac:cxnSpMkLst>
+        </pc:cxnChg>
+        <pc:cxnChg chg="mod">
+          <ac:chgData name="Tyler Milewski" userId="d8a66fee8314b92f" providerId="LiveId" clId="{ADA63225-3704-4ED7-AB8D-FBA0AB58D6E0}" dt="2024-01-02T16:00:17.404" v="26" actId="165"/>
+          <ac:cxnSpMkLst>
+            <pc:docMk/>
+            <pc:sldMk cId="221866749" sldId="256"/>
+            <ac:cxnSpMk id="184" creationId="{F63C593A-E5F4-1D62-311B-10390A53AF23}"/>
+          </ac:cxnSpMkLst>
+        </pc:cxnChg>
+        <pc:cxnChg chg="mod">
+          <ac:chgData name="Tyler Milewski" userId="d8a66fee8314b92f" providerId="LiveId" clId="{ADA63225-3704-4ED7-AB8D-FBA0AB58D6E0}" dt="2024-01-02T16:00:17.404" v="26" actId="165"/>
+          <ac:cxnSpMkLst>
+            <pc:docMk/>
+            <pc:sldMk cId="221866749" sldId="256"/>
+            <ac:cxnSpMk id="185" creationId="{7970291B-1CEF-10A3-DB48-5FB9FBF084EE}"/>
+          </ac:cxnSpMkLst>
+        </pc:cxnChg>
+        <pc:cxnChg chg="mod">
+          <ac:chgData name="Tyler Milewski" userId="d8a66fee8314b92f" providerId="LiveId" clId="{ADA63225-3704-4ED7-AB8D-FBA0AB58D6E0}" dt="2024-01-02T16:00:17.404" v="26" actId="165"/>
+          <ac:cxnSpMkLst>
+            <pc:docMk/>
+            <pc:sldMk cId="221866749" sldId="256"/>
+            <ac:cxnSpMk id="186" creationId="{E22018D7-4E57-5014-2DBD-CC6EEE2BE92F}"/>
+          </ac:cxnSpMkLst>
+        </pc:cxnChg>
+        <pc:cxnChg chg="mod">
+          <ac:chgData name="Tyler Milewski" userId="d8a66fee8314b92f" providerId="LiveId" clId="{ADA63225-3704-4ED7-AB8D-FBA0AB58D6E0}" dt="2024-01-02T16:00:17.404" v="26" actId="165"/>
+          <ac:cxnSpMkLst>
+            <pc:docMk/>
+            <pc:sldMk cId="221866749" sldId="256"/>
+            <ac:cxnSpMk id="188" creationId="{894C9A55-7122-94DB-B627-BFCC96BF4DFD}"/>
+          </ac:cxnSpMkLst>
+        </pc:cxnChg>
+        <pc:cxnChg chg="mod">
+          <ac:chgData name="Tyler Milewski" userId="d8a66fee8314b92f" providerId="LiveId" clId="{ADA63225-3704-4ED7-AB8D-FBA0AB58D6E0}" dt="2024-01-02T16:00:17.404" v="26" actId="165"/>
+          <ac:cxnSpMkLst>
+            <pc:docMk/>
+            <pc:sldMk cId="221866749" sldId="256"/>
+            <ac:cxnSpMk id="189" creationId="{CD66530D-B9B6-9952-4018-D6D291BE4CCB}"/>
+          </ac:cxnSpMkLst>
+        </pc:cxnChg>
+        <pc:cxnChg chg="mod">
+          <ac:chgData name="Tyler Milewski" userId="d8a66fee8314b92f" providerId="LiveId" clId="{ADA63225-3704-4ED7-AB8D-FBA0AB58D6E0}" dt="2024-01-02T16:00:17.404" v="26" actId="165"/>
+          <ac:cxnSpMkLst>
+            <pc:docMk/>
+            <pc:sldMk cId="221866749" sldId="256"/>
+            <ac:cxnSpMk id="190" creationId="{20E9C813-2585-3092-315E-264E8C843F66}"/>
+          </ac:cxnSpMkLst>
+        </pc:cxnChg>
+        <pc:cxnChg chg="mod">
+          <ac:chgData name="Tyler Milewski" userId="d8a66fee8314b92f" providerId="LiveId" clId="{ADA63225-3704-4ED7-AB8D-FBA0AB58D6E0}" dt="2024-01-02T16:00:17.404" v="26" actId="165"/>
+          <ac:cxnSpMkLst>
+            <pc:docMk/>
+            <pc:sldMk cId="221866749" sldId="256"/>
+            <ac:cxnSpMk id="191" creationId="{F9E48F50-3CD8-437C-9225-C4A8D2F2476C}"/>
+          </ac:cxnSpMkLst>
+        </pc:cxnChg>
+        <pc:cxnChg chg="mod">
+          <ac:chgData name="Tyler Milewski" userId="d8a66fee8314b92f" providerId="LiveId" clId="{ADA63225-3704-4ED7-AB8D-FBA0AB58D6E0}" dt="2024-01-02T16:00:17.404" v="26" actId="165"/>
+          <ac:cxnSpMkLst>
+            <pc:docMk/>
+            <pc:sldMk cId="221866749" sldId="256"/>
+            <ac:cxnSpMk id="192" creationId="{11FA276B-ADBC-BA7D-3339-3F6D72CE533B}"/>
+          </ac:cxnSpMkLst>
+        </pc:cxnChg>
       </pc:sldChg>
     </pc:docChg>
   </pc:docChgLst>
@@ -178,8 +810,8 @@
         </p:nvSpPr>
         <p:spPr>
           <a:xfrm>
-            <a:off x="1714500" y="1122363"/>
-            <a:ext cx="10287000" cy="2387600"/>
+            <a:off x="1828800" y="1122363"/>
+            <a:ext cx="10972800" cy="2387600"/>
           </a:xfrm>
         </p:spPr>
         <p:txBody>
@@ -210,8 +842,8 @@
         </p:nvSpPr>
         <p:spPr>
           <a:xfrm>
-            <a:off x="1714500" y="3602038"/>
-            <a:ext cx="10287000" cy="1655762"/>
+            <a:off x="1828800" y="3602038"/>
+            <a:ext cx="10972800" cy="1655762"/>
           </a:xfrm>
         </p:spPr>
         <p:txBody>
@@ -280,7 +912,7 @@
           <a:p>
             <a:fld id="{89DBFC7E-BFA0-4D06-9EF3-77D23FEE14F6}" type="datetimeFigureOut">
               <a:rPr lang="en-US" smtClean="0"/>
-              <a:t>12/16/2023</a:t>
+              <a:t>1/2/2024</a:t>
             </a:fld>
             <a:endParaRPr lang="en-US"/>
           </a:p>
@@ -331,7 +963,7 @@
     </p:spTree>
     <p:extLst>
       <p:ext uri="{BB962C8B-B14F-4D97-AF65-F5344CB8AC3E}">
-        <p14:creationId xmlns:p14="http://schemas.microsoft.com/office/powerpoint/2010/main" val="208562745"/>
+        <p14:creationId xmlns:p14="http://schemas.microsoft.com/office/powerpoint/2010/main" val="808409734"/>
       </p:ext>
     </p:extLst>
   </p:cSld>
@@ -450,7 +1082,7 @@
           <a:p>
             <a:fld id="{89DBFC7E-BFA0-4D06-9EF3-77D23FEE14F6}" type="datetimeFigureOut">
               <a:rPr lang="en-US" smtClean="0"/>
-              <a:t>12/16/2023</a:t>
+              <a:t>1/2/2024</a:t>
             </a:fld>
             <a:endParaRPr lang="en-US"/>
           </a:p>
@@ -501,7 +1133,7 @@
     </p:spTree>
     <p:extLst>
       <p:ext uri="{BB962C8B-B14F-4D97-AF65-F5344CB8AC3E}">
-        <p14:creationId xmlns:p14="http://schemas.microsoft.com/office/powerpoint/2010/main" val="2101732406"/>
+        <p14:creationId xmlns:p14="http://schemas.microsoft.com/office/powerpoint/2010/main" val="3211215462"/>
       </p:ext>
     </p:extLst>
   </p:cSld>
@@ -540,8 +1172,8 @@
         </p:nvSpPr>
         <p:spPr>
           <a:xfrm>
-            <a:off x="9815512" y="365125"/>
-            <a:ext cx="2957513" cy="5811838"/>
+            <a:off x="10469880" y="365125"/>
+            <a:ext cx="3154680" cy="5811838"/>
           </a:xfrm>
         </p:spPr>
         <p:txBody>
@@ -568,8 +1200,8 @@
         </p:nvSpPr>
         <p:spPr>
           <a:xfrm>
-            <a:off x="942975" y="365125"/>
-            <a:ext cx="8701088" cy="5811838"/>
+            <a:off x="1005840" y="365125"/>
+            <a:ext cx="9281160" cy="5811838"/>
           </a:xfrm>
         </p:spPr>
         <p:txBody>
@@ -630,7 +1262,7 @@
           <a:p>
             <a:fld id="{89DBFC7E-BFA0-4D06-9EF3-77D23FEE14F6}" type="datetimeFigureOut">
               <a:rPr lang="en-US" smtClean="0"/>
-              <a:t>12/16/2023</a:t>
+              <a:t>1/2/2024</a:t>
             </a:fld>
             <a:endParaRPr lang="en-US"/>
           </a:p>
@@ -681,7 +1313,7 @@
     </p:spTree>
     <p:extLst>
       <p:ext uri="{BB962C8B-B14F-4D97-AF65-F5344CB8AC3E}">
-        <p14:creationId xmlns:p14="http://schemas.microsoft.com/office/powerpoint/2010/main" val="2614730109"/>
+        <p14:creationId xmlns:p14="http://schemas.microsoft.com/office/powerpoint/2010/main" val="23675358"/>
       </p:ext>
     </p:extLst>
   </p:cSld>
@@ -800,7 +1432,7 @@
           <a:p>
             <a:fld id="{89DBFC7E-BFA0-4D06-9EF3-77D23FEE14F6}" type="datetimeFigureOut">
               <a:rPr lang="en-US" smtClean="0"/>
-              <a:t>12/16/2023</a:t>
+              <a:t>1/2/2024</a:t>
             </a:fld>
             <a:endParaRPr lang="en-US"/>
           </a:p>
@@ -851,7 +1483,7 @@
     </p:spTree>
     <p:extLst>
       <p:ext uri="{BB962C8B-B14F-4D97-AF65-F5344CB8AC3E}">
-        <p14:creationId xmlns:p14="http://schemas.microsoft.com/office/powerpoint/2010/main" val="3582060632"/>
+        <p14:creationId xmlns:p14="http://schemas.microsoft.com/office/powerpoint/2010/main" val="1931183931"/>
       </p:ext>
     </p:extLst>
   </p:cSld>
@@ -890,8 +1522,8 @@
         </p:nvSpPr>
         <p:spPr>
           <a:xfrm>
-            <a:off x="935831" y="1709739"/>
-            <a:ext cx="11830050" cy="2852737"/>
+            <a:off x="998220" y="1709739"/>
+            <a:ext cx="12618720" cy="2852737"/>
           </a:xfrm>
         </p:spPr>
         <p:txBody>
@@ -922,8 +1554,8 @@
         </p:nvSpPr>
         <p:spPr>
           <a:xfrm>
-            <a:off x="935831" y="4589464"/>
-            <a:ext cx="11830050" cy="1500187"/>
+            <a:off x="998220" y="4589464"/>
+            <a:ext cx="12618720" cy="1500187"/>
           </a:xfrm>
         </p:spPr>
         <p:txBody>
@@ -1046,7 +1678,7 @@
           <a:p>
             <a:fld id="{89DBFC7E-BFA0-4D06-9EF3-77D23FEE14F6}" type="datetimeFigureOut">
               <a:rPr lang="en-US" smtClean="0"/>
-              <a:t>12/16/2023</a:t>
+              <a:t>1/2/2024</a:t>
             </a:fld>
             <a:endParaRPr lang="en-US"/>
           </a:p>
@@ -1097,7 +1729,7 @@
     </p:spTree>
     <p:extLst>
       <p:ext uri="{BB962C8B-B14F-4D97-AF65-F5344CB8AC3E}">
-        <p14:creationId xmlns:p14="http://schemas.microsoft.com/office/powerpoint/2010/main" val="1410621915"/>
+        <p14:creationId xmlns:p14="http://schemas.microsoft.com/office/powerpoint/2010/main" val="758573361"/>
       </p:ext>
     </p:extLst>
   </p:cSld>
@@ -1159,8 +1791,8 @@
         </p:nvSpPr>
         <p:spPr>
           <a:xfrm>
-            <a:off x="942975" y="1825625"/>
-            <a:ext cx="5829300" cy="4351338"/>
+            <a:off x="1005840" y="1825625"/>
+            <a:ext cx="6217920" cy="4351338"/>
           </a:xfrm>
         </p:spPr>
         <p:txBody>
@@ -1216,8 +1848,8 @@
         </p:nvSpPr>
         <p:spPr>
           <a:xfrm>
-            <a:off x="6943725" y="1825625"/>
-            <a:ext cx="5829300" cy="4351338"/>
+            <a:off x="7406640" y="1825625"/>
+            <a:ext cx="6217920" cy="4351338"/>
           </a:xfrm>
         </p:spPr>
         <p:txBody>
@@ -1278,7 +1910,7 @@
           <a:p>
             <a:fld id="{89DBFC7E-BFA0-4D06-9EF3-77D23FEE14F6}" type="datetimeFigureOut">
               <a:rPr lang="en-US" smtClean="0"/>
-              <a:t>12/16/2023</a:t>
+              <a:t>1/2/2024</a:t>
             </a:fld>
             <a:endParaRPr lang="en-US"/>
           </a:p>
@@ -1329,7 +1961,7 @@
     </p:spTree>
     <p:extLst>
       <p:ext uri="{BB962C8B-B14F-4D97-AF65-F5344CB8AC3E}">
-        <p14:creationId xmlns:p14="http://schemas.microsoft.com/office/powerpoint/2010/main" val="2394067740"/>
+        <p14:creationId xmlns:p14="http://schemas.microsoft.com/office/powerpoint/2010/main" val="1020500521"/>
       </p:ext>
     </p:extLst>
   </p:cSld>
@@ -1368,8 +2000,8 @@
         </p:nvSpPr>
         <p:spPr>
           <a:xfrm>
-            <a:off x="944762" y="365126"/>
-            <a:ext cx="11830050" cy="1325563"/>
+            <a:off x="1007746" y="365126"/>
+            <a:ext cx="12618720" cy="1325563"/>
           </a:xfrm>
         </p:spPr>
         <p:txBody>
@@ -1396,8 +2028,8 @@
         </p:nvSpPr>
         <p:spPr>
           <a:xfrm>
-            <a:off x="944762" y="1681163"/>
-            <a:ext cx="5802510" cy="823912"/>
+            <a:off x="1007746" y="1681163"/>
+            <a:ext cx="6189344" cy="823912"/>
           </a:xfrm>
         </p:spPr>
         <p:txBody>
@@ -1461,8 +2093,8 @@
         </p:nvSpPr>
         <p:spPr>
           <a:xfrm>
-            <a:off x="944762" y="2505075"/>
-            <a:ext cx="5802510" cy="3684588"/>
+            <a:off x="1007746" y="2505075"/>
+            <a:ext cx="6189344" cy="3684588"/>
           </a:xfrm>
         </p:spPr>
         <p:txBody>
@@ -1518,8 +2150,8 @@
         </p:nvSpPr>
         <p:spPr>
           <a:xfrm>
-            <a:off x="6943725" y="1681163"/>
-            <a:ext cx="5831087" cy="823912"/>
+            <a:off x="7406640" y="1681163"/>
+            <a:ext cx="6219826" cy="823912"/>
           </a:xfrm>
         </p:spPr>
         <p:txBody>
@@ -1583,8 +2215,8 @@
         </p:nvSpPr>
         <p:spPr>
           <a:xfrm>
-            <a:off x="6943725" y="2505075"/>
-            <a:ext cx="5831087" cy="3684588"/>
+            <a:off x="7406640" y="2505075"/>
+            <a:ext cx="6219826" cy="3684588"/>
           </a:xfrm>
         </p:spPr>
         <p:txBody>
@@ -1645,7 +2277,7 @@
           <a:p>
             <a:fld id="{89DBFC7E-BFA0-4D06-9EF3-77D23FEE14F6}" type="datetimeFigureOut">
               <a:rPr lang="en-US" smtClean="0"/>
-              <a:t>12/16/2023</a:t>
+              <a:t>1/2/2024</a:t>
             </a:fld>
             <a:endParaRPr lang="en-US"/>
           </a:p>
@@ -1696,7 +2328,7 @@
     </p:spTree>
     <p:extLst>
       <p:ext uri="{BB962C8B-B14F-4D97-AF65-F5344CB8AC3E}">
-        <p14:creationId xmlns:p14="http://schemas.microsoft.com/office/powerpoint/2010/main" val="566757648"/>
+        <p14:creationId xmlns:p14="http://schemas.microsoft.com/office/powerpoint/2010/main" val="3693086726"/>
       </p:ext>
     </p:extLst>
   </p:cSld>
@@ -1763,7 +2395,7 @@
           <a:p>
             <a:fld id="{89DBFC7E-BFA0-4D06-9EF3-77D23FEE14F6}" type="datetimeFigureOut">
               <a:rPr lang="en-US" smtClean="0"/>
-              <a:t>12/16/2023</a:t>
+              <a:t>1/2/2024</a:t>
             </a:fld>
             <a:endParaRPr lang="en-US"/>
           </a:p>
@@ -1814,7 +2446,7 @@
     </p:spTree>
     <p:extLst>
       <p:ext uri="{BB962C8B-B14F-4D97-AF65-F5344CB8AC3E}">
-        <p14:creationId xmlns:p14="http://schemas.microsoft.com/office/powerpoint/2010/main" val="1039903611"/>
+        <p14:creationId xmlns:p14="http://schemas.microsoft.com/office/powerpoint/2010/main" val="3210160173"/>
       </p:ext>
     </p:extLst>
   </p:cSld>
@@ -1858,7 +2490,7 @@
           <a:p>
             <a:fld id="{89DBFC7E-BFA0-4D06-9EF3-77D23FEE14F6}" type="datetimeFigureOut">
               <a:rPr lang="en-US" smtClean="0"/>
-              <a:t>12/16/2023</a:t>
+              <a:t>1/2/2024</a:t>
             </a:fld>
             <a:endParaRPr lang="en-US"/>
           </a:p>
@@ -1909,7 +2541,7 @@
     </p:spTree>
     <p:extLst>
       <p:ext uri="{BB962C8B-B14F-4D97-AF65-F5344CB8AC3E}">
-        <p14:creationId xmlns:p14="http://schemas.microsoft.com/office/powerpoint/2010/main" val="894101785"/>
+        <p14:creationId xmlns:p14="http://schemas.microsoft.com/office/powerpoint/2010/main" val="379720445"/>
       </p:ext>
     </p:extLst>
   </p:cSld>
@@ -1948,8 +2580,8 @@
         </p:nvSpPr>
         <p:spPr>
           <a:xfrm>
-            <a:off x="944762" y="457200"/>
-            <a:ext cx="4423767" cy="1600200"/>
+            <a:off x="1007746" y="457200"/>
+            <a:ext cx="4718684" cy="1600200"/>
           </a:xfrm>
         </p:spPr>
         <p:txBody>
@@ -1980,8 +2612,8 @@
         </p:nvSpPr>
         <p:spPr>
           <a:xfrm>
-            <a:off x="5831087" y="987426"/>
-            <a:ext cx="6943725" cy="4873625"/>
+            <a:off x="6219826" y="987426"/>
+            <a:ext cx="7406640" cy="4873625"/>
           </a:xfrm>
         </p:spPr>
         <p:txBody>
@@ -2065,8 +2697,8 @@
         </p:nvSpPr>
         <p:spPr>
           <a:xfrm>
-            <a:off x="944762" y="2057400"/>
-            <a:ext cx="4423767" cy="3811588"/>
+            <a:off x="1007746" y="2057400"/>
+            <a:ext cx="4718684" cy="3811588"/>
           </a:xfrm>
         </p:spPr>
         <p:txBody>
@@ -2135,7 +2767,7 @@
           <a:p>
             <a:fld id="{89DBFC7E-BFA0-4D06-9EF3-77D23FEE14F6}" type="datetimeFigureOut">
               <a:rPr lang="en-US" smtClean="0"/>
-              <a:t>12/16/2023</a:t>
+              <a:t>1/2/2024</a:t>
             </a:fld>
             <a:endParaRPr lang="en-US"/>
           </a:p>
@@ -2186,7 +2818,7 @@
     </p:spTree>
     <p:extLst>
       <p:ext uri="{BB962C8B-B14F-4D97-AF65-F5344CB8AC3E}">
-        <p14:creationId xmlns:p14="http://schemas.microsoft.com/office/powerpoint/2010/main" val="4194412873"/>
+        <p14:creationId xmlns:p14="http://schemas.microsoft.com/office/powerpoint/2010/main" val="1377225793"/>
       </p:ext>
     </p:extLst>
   </p:cSld>
@@ -2225,8 +2857,8 @@
         </p:nvSpPr>
         <p:spPr>
           <a:xfrm>
-            <a:off x="944762" y="457200"/>
-            <a:ext cx="4423767" cy="1600200"/>
+            <a:off x="1007746" y="457200"/>
+            <a:ext cx="4718684" cy="1600200"/>
           </a:xfrm>
         </p:spPr>
         <p:txBody>
@@ -2257,8 +2889,8 @@
         </p:nvSpPr>
         <p:spPr>
           <a:xfrm>
-            <a:off x="5831087" y="987426"/>
-            <a:ext cx="6943725" cy="4873625"/>
+            <a:off x="6219826" y="987426"/>
+            <a:ext cx="7406640" cy="4873625"/>
           </a:xfrm>
         </p:spPr>
         <p:txBody>
@@ -2322,8 +2954,8 @@
         </p:nvSpPr>
         <p:spPr>
           <a:xfrm>
-            <a:off x="944762" y="2057400"/>
-            <a:ext cx="4423767" cy="3811588"/>
+            <a:off x="1007746" y="2057400"/>
+            <a:ext cx="4718684" cy="3811588"/>
           </a:xfrm>
         </p:spPr>
         <p:txBody>
@@ -2392,7 +3024,7 @@
           <a:p>
             <a:fld id="{89DBFC7E-BFA0-4D06-9EF3-77D23FEE14F6}" type="datetimeFigureOut">
               <a:rPr lang="en-US" smtClean="0"/>
-              <a:t>12/16/2023</a:t>
+              <a:t>1/2/2024</a:t>
             </a:fld>
             <a:endParaRPr lang="en-US"/>
           </a:p>
@@ -2443,7 +3075,7 @@
     </p:spTree>
     <p:extLst>
       <p:ext uri="{BB962C8B-B14F-4D97-AF65-F5344CB8AC3E}">
-        <p14:creationId xmlns:p14="http://schemas.microsoft.com/office/powerpoint/2010/main" val="2289498743"/>
+        <p14:creationId xmlns:p14="http://schemas.microsoft.com/office/powerpoint/2010/main" val="363691072"/>
       </p:ext>
     </p:extLst>
   </p:cSld>
@@ -2487,8 +3119,8 @@
         </p:nvSpPr>
         <p:spPr>
           <a:xfrm>
-            <a:off x="942975" y="365126"/>
-            <a:ext cx="11830050" cy="1325563"/>
+            <a:off x="1005840" y="365126"/>
+            <a:ext cx="12618720" cy="1325563"/>
           </a:xfrm>
           <a:prstGeom prst="rect">
             <a:avLst/>
@@ -2520,8 +3152,8 @@
         </p:nvSpPr>
         <p:spPr>
           <a:xfrm>
-            <a:off x="942975" y="1825625"/>
-            <a:ext cx="11830050" cy="4351338"/>
+            <a:off x="1005840" y="1825625"/>
+            <a:ext cx="12618720" cy="4351338"/>
           </a:xfrm>
           <a:prstGeom prst="rect">
             <a:avLst/>
@@ -2582,8 +3214,8 @@
         </p:nvSpPr>
         <p:spPr>
           <a:xfrm>
-            <a:off x="942975" y="6356351"/>
-            <a:ext cx="3086100" cy="365125"/>
+            <a:off x="1005840" y="6356351"/>
+            <a:ext cx="3291840" cy="365125"/>
           </a:xfrm>
           <a:prstGeom prst="rect">
             <a:avLst/>
@@ -2605,7 +3237,7 @@
           <a:p>
             <a:fld id="{89DBFC7E-BFA0-4D06-9EF3-77D23FEE14F6}" type="datetimeFigureOut">
               <a:rPr lang="en-US" smtClean="0"/>
-              <a:t>12/16/2023</a:t>
+              <a:t>1/2/2024</a:t>
             </a:fld>
             <a:endParaRPr lang="en-US"/>
           </a:p>
@@ -2623,8 +3255,8 @@
         </p:nvSpPr>
         <p:spPr>
           <a:xfrm>
-            <a:off x="4543425" y="6356351"/>
-            <a:ext cx="4629150" cy="365125"/>
+            <a:off x="4846320" y="6356351"/>
+            <a:ext cx="4937760" cy="365125"/>
           </a:xfrm>
           <a:prstGeom prst="rect">
             <a:avLst/>
@@ -2660,8 +3292,8 @@
         </p:nvSpPr>
         <p:spPr>
           <a:xfrm>
-            <a:off x="9686925" y="6356351"/>
-            <a:ext cx="3086100" cy="365125"/>
+            <a:off x="10332720" y="6356351"/>
+            <a:ext cx="3291840" cy="365125"/>
           </a:xfrm>
           <a:prstGeom prst="rect">
             <a:avLst/>
@@ -2692,23 +3324,23 @@
     </p:spTree>
     <p:extLst>
       <p:ext uri="{BB962C8B-B14F-4D97-AF65-F5344CB8AC3E}">
-        <p14:creationId xmlns:p14="http://schemas.microsoft.com/office/powerpoint/2010/main" val="1064437819"/>
+        <p14:creationId xmlns:p14="http://schemas.microsoft.com/office/powerpoint/2010/main" val="765572516"/>
       </p:ext>
     </p:extLst>
   </p:cSld>
   <p:clrMap bg1="lt1" tx1="dk1" bg2="lt2" tx2="dk2" accent1="accent1" accent2="accent2" accent3="accent3" accent4="accent4" accent5="accent5" accent6="accent6" hlink="hlink" folHlink="folHlink"/>
   <p:sldLayoutIdLst>
-    <p:sldLayoutId id="2147483685" r:id="rId1"/>
-    <p:sldLayoutId id="2147483686" r:id="rId2"/>
-    <p:sldLayoutId id="2147483687" r:id="rId3"/>
-    <p:sldLayoutId id="2147483688" r:id="rId4"/>
-    <p:sldLayoutId id="2147483689" r:id="rId5"/>
-    <p:sldLayoutId id="2147483690" r:id="rId6"/>
-    <p:sldLayoutId id="2147483691" r:id="rId7"/>
-    <p:sldLayoutId id="2147483692" r:id="rId8"/>
-    <p:sldLayoutId id="2147483693" r:id="rId9"/>
-    <p:sldLayoutId id="2147483694" r:id="rId10"/>
-    <p:sldLayoutId id="2147483695" r:id="rId11"/>
+    <p:sldLayoutId id="2147483697" r:id="rId1"/>
+    <p:sldLayoutId id="2147483698" r:id="rId2"/>
+    <p:sldLayoutId id="2147483699" r:id="rId3"/>
+    <p:sldLayoutId id="2147483700" r:id="rId4"/>
+    <p:sldLayoutId id="2147483701" r:id="rId5"/>
+    <p:sldLayoutId id="2147483702" r:id="rId6"/>
+    <p:sldLayoutId id="2147483703" r:id="rId7"/>
+    <p:sldLayoutId id="2147483704" r:id="rId8"/>
+    <p:sldLayoutId id="2147483705" r:id="rId9"/>
+    <p:sldLayoutId id="2147483706" r:id="rId10"/>
+    <p:sldLayoutId id="2147483707" r:id="rId11"/>
   </p:sldLayoutIdLst>
   <p:txStyles>
     <p:titleStyle>
@@ -3012,10 +3644,10 @@
       </p:grpSpPr>
       <p:grpSp>
         <p:nvGrpSpPr>
-          <p:cNvPr id="194" name="Group 193">
+          <p:cNvPr id="37" name="Group 36">
             <a:extLst>
               <a:ext uri="{FF2B5EF4-FFF2-40B4-BE49-F238E27FC236}">
-                <a16:creationId xmlns:a16="http://schemas.microsoft.com/office/drawing/2014/main" id="{6205038D-465E-99EC-B4C3-02612103F22A}"/>
+                <a16:creationId xmlns:a16="http://schemas.microsoft.com/office/drawing/2014/main" id="{A64C00C1-1832-C45B-1500-67951A687F17}"/>
               </a:ext>
             </a:extLst>
           </p:cNvPr>
@@ -3024,54 +3656,18 @@
         </p:nvGrpSpPr>
         <p:grpSpPr>
           <a:xfrm>
-            <a:off x="0" y="682713"/>
-            <a:ext cx="13716000" cy="2973713"/>
-            <a:chOff x="0" y="600442"/>
-            <a:chExt cx="13716000" cy="2973713"/>
+            <a:off x="405246" y="260849"/>
+            <a:ext cx="13831130" cy="3014850"/>
+            <a:chOff x="0" y="188252"/>
+            <a:chExt cx="13831130" cy="3014850"/>
           </a:xfrm>
         </p:grpSpPr>
-        <p:pic>
-          <p:nvPicPr>
-            <p:cNvPr id="118" name="Picture 117">
+        <p:grpSp>
+          <p:nvGrpSpPr>
+            <p:cNvPr id="9" name="Group 8">
               <a:extLst>
                 <a:ext uri="{FF2B5EF4-FFF2-40B4-BE49-F238E27FC236}">
-                  <a16:creationId xmlns:a16="http://schemas.microsoft.com/office/drawing/2014/main" id="{33CF2442-9D6B-34C2-BE84-876E7AC71A53}"/>
-                </a:ext>
-              </a:extLst>
-            </p:cNvPr>
-            <p:cNvPicPr>
-              <a:picLocks noChangeAspect="1"/>
-            </p:cNvPicPr>
-            <p:nvPr/>
-          </p:nvPicPr>
-          <p:blipFill>
-            <a:blip r:embed="rId2">
-              <a:extLst>
-                <a:ext uri="{28A0092B-C50C-407E-A947-70E740481C1C}">
-                  <a14:useLocalDpi xmlns:a14="http://schemas.microsoft.com/office/drawing/2010/main" val="0"/>
-                </a:ext>
-              </a:extLst>
-            </a:blip>
-            <a:stretch>
-              <a:fillRect/>
-            </a:stretch>
-          </p:blipFill>
-          <p:spPr>
-            <a:xfrm>
-              <a:off x="0" y="1326255"/>
-              <a:ext cx="13716000" cy="2247900"/>
-            </a:xfrm>
-            <a:prstGeom prst="rect">
-              <a:avLst/>
-            </a:prstGeom>
-          </p:spPr>
-        </p:pic>
-        <p:grpSp>
-          <p:nvGrpSpPr>
-            <p:cNvPr id="171" name="Group 170">
-              <a:extLst>
-                <a:ext uri="{FF2B5EF4-FFF2-40B4-BE49-F238E27FC236}">
-                  <a16:creationId xmlns:a16="http://schemas.microsoft.com/office/drawing/2014/main" id="{95527DFA-BE3E-2D08-51A1-2C090F549B6D}"/>
+                  <a16:creationId xmlns:a16="http://schemas.microsoft.com/office/drawing/2014/main" id="{A162EAEB-919F-D8D4-41C4-C03A0B9BA769}"/>
                 </a:ext>
               </a:extLst>
             </p:cNvPr>
@@ -3080,18 +3676,48 @@
           </p:nvGrpSpPr>
           <p:grpSpPr>
             <a:xfrm>
-              <a:off x="238255" y="600442"/>
-              <a:ext cx="12050336" cy="725813"/>
-              <a:chOff x="238255" y="600442"/>
-              <a:chExt cx="12050336" cy="725813"/>
+              <a:off x="115130" y="261070"/>
+              <a:ext cx="13716000" cy="2942032"/>
+              <a:chOff x="11222" y="511488"/>
+              <a:chExt cx="13716000" cy="2942032"/>
             </a:xfrm>
           </p:grpSpPr>
+          <p:pic>
+            <p:nvPicPr>
+              <p:cNvPr id="5" name="Picture 4">
+                <a:extLst>
+                  <a:ext uri="{FF2B5EF4-FFF2-40B4-BE49-F238E27FC236}">
+                    <a16:creationId xmlns:a16="http://schemas.microsoft.com/office/drawing/2014/main" id="{63447E14-8BD5-3EC5-9F6C-92D97251C924}"/>
+                  </a:ext>
+                </a:extLst>
+              </p:cNvPr>
+              <p:cNvPicPr>
+                <a:picLocks noChangeAspect="1"/>
+              </p:cNvPicPr>
+              <p:nvPr/>
+            </p:nvPicPr>
+            <p:blipFill>
+              <a:blip r:embed="rId2"/>
+              <a:stretch>
+                <a:fillRect/>
+              </a:stretch>
+            </p:blipFill>
+            <p:spPr>
+              <a:xfrm>
+                <a:off x="11222" y="1205620"/>
+                <a:ext cx="13716000" cy="2247900"/>
+              </a:xfrm>
+              <a:prstGeom prst="rect">
+                <a:avLst/>
+              </a:prstGeom>
+            </p:spPr>
+          </p:pic>
           <p:grpSp>
             <p:nvGrpSpPr>
-              <p:cNvPr id="138" name="Group 137">
+              <p:cNvPr id="171" name="Group 170">
                 <a:extLst>
                   <a:ext uri="{FF2B5EF4-FFF2-40B4-BE49-F238E27FC236}">
-                    <a16:creationId xmlns:a16="http://schemas.microsoft.com/office/drawing/2014/main" id="{DB2DD103-2A94-70B8-48A9-6A7ED7AE6C31}"/>
+                    <a16:creationId xmlns:a16="http://schemas.microsoft.com/office/drawing/2014/main" id="{95527DFA-BE3E-2D08-51A1-2C090F549B6D}"/>
                   </a:ext>
                 </a:extLst>
               </p:cNvPr>
@@ -3100,54 +3726,18 @@
             </p:nvGrpSpPr>
             <p:grpSpPr>
               <a:xfrm>
-                <a:off x="238255" y="983193"/>
-                <a:ext cx="5883501" cy="343062"/>
-                <a:chOff x="238255" y="983193"/>
-                <a:chExt cx="5883501" cy="343062"/>
+                <a:off x="222176" y="511488"/>
+                <a:ext cx="12050336" cy="725813"/>
+                <a:chOff x="238255" y="600442"/>
+                <a:chExt cx="12050336" cy="725813"/>
               </a:xfrm>
             </p:grpSpPr>
-            <p:cxnSp>
-              <p:nvCxnSpPr>
-                <p:cNvPr id="30" name="Straight Connector 29">
+            <p:grpSp>
+              <p:nvGrpSpPr>
+                <p:cNvPr id="138" name="Group 137">
                   <a:extLst>
                     <a:ext uri="{FF2B5EF4-FFF2-40B4-BE49-F238E27FC236}">
-                      <a16:creationId xmlns:a16="http://schemas.microsoft.com/office/drawing/2014/main" id="{E4C311EF-EF85-CAD1-55E0-53CB4A61339B}"/>
-                    </a:ext>
-                  </a:extLst>
-                </p:cNvPr>
-                <p:cNvCxnSpPr/>
-                <p:nvPr/>
-              </p:nvCxnSpPr>
-              <p:spPr>
-                <a:xfrm>
-                  <a:off x="238255" y="983193"/>
-                  <a:ext cx="2807595" cy="0"/>
-                </a:xfrm>
-                <a:prstGeom prst="line">
-                  <a:avLst/>
-                </a:prstGeom>
-              </p:spPr>
-              <p:style>
-                <a:lnRef idx="2">
-                  <a:schemeClr val="dk1"/>
-                </a:lnRef>
-                <a:fillRef idx="0">
-                  <a:schemeClr val="dk1"/>
-                </a:fillRef>
-                <a:effectRef idx="1">
-                  <a:schemeClr val="dk1"/>
-                </a:effectRef>
-                <a:fontRef idx="minor">
-                  <a:schemeClr val="tx1"/>
-                </a:fontRef>
-              </p:style>
-            </p:cxnSp>
-            <p:grpSp>
-              <p:nvGrpSpPr>
-                <p:cNvPr id="131" name="Group 130">
-                  <a:extLst>
-                    <a:ext uri="{FF2B5EF4-FFF2-40B4-BE49-F238E27FC236}">
-                      <a16:creationId xmlns:a16="http://schemas.microsoft.com/office/drawing/2014/main" id="{0BCD7190-3696-7E16-B8DC-B04A861CE343}"/>
+                      <a16:creationId xmlns:a16="http://schemas.microsoft.com/office/drawing/2014/main" id="{DB2DD103-2A94-70B8-48A9-6A7ED7AE6C31}"/>
                     </a:ext>
                   </a:extLst>
                 </p:cNvPr>
@@ -3164,10 +3754,10 @@
               </p:grpSpPr>
               <p:cxnSp>
                 <p:nvCxnSpPr>
-                  <p:cNvPr id="27" name="Straight Connector 26">
+                  <p:cNvPr id="30" name="Straight Connector 29">
                     <a:extLst>
                       <a:ext uri="{FF2B5EF4-FFF2-40B4-BE49-F238E27FC236}">
-                        <a16:creationId xmlns:a16="http://schemas.microsoft.com/office/drawing/2014/main" id="{0124E632-8D9E-9F6E-07EA-6F32569E3758}"/>
+                        <a16:creationId xmlns:a16="http://schemas.microsoft.com/office/drawing/2014/main" id="{E4C311EF-EF85-CAD1-55E0-53CB4A61339B}"/>
                       </a:ext>
                     </a:extLst>
                   </p:cNvPr>
@@ -3177,150 +3767,6 @@
                 <p:spPr>
                   <a:xfrm>
                     <a:off x="238255" y="983193"/>
-                    <a:ext cx="0" cy="343062"/>
-                  </a:xfrm>
-                  <a:prstGeom prst="line">
-                    <a:avLst/>
-                  </a:prstGeom>
-                </p:spPr>
-                <p:style>
-                  <a:lnRef idx="2">
-                    <a:schemeClr val="dk1"/>
-                  </a:lnRef>
-                  <a:fillRef idx="0">
-                    <a:schemeClr val="dk1"/>
-                  </a:fillRef>
-                  <a:effectRef idx="1">
-                    <a:schemeClr val="dk1"/>
-                  </a:effectRef>
-                  <a:fontRef idx="minor">
-                    <a:schemeClr val="tx1"/>
-                  </a:fontRef>
-                </p:style>
-              </p:cxnSp>
-              <p:cxnSp>
-                <p:nvCxnSpPr>
-                  <p:cNvPr id="28" name="Straight Connector 27">
-                    <a:extLst>
-                      <a:ext uri="{FF2B5EF4-FFF2-40B4-BE49-F238E27FC236}">
-                        <a16:creationId xmlns:a16="http://schemas.microsoft.com/office/drawing/2014/main" id="{9F01D024-0A4F-A0EC-F9F8-5E14C6AF2D1B}"/>
-                      </a:ext>
-                    </a:extLst>
-                  </p:cNvPr>
-                  <p:cNvCxnSpPr/>
-                  <p:nvPr/>
-                </p:nvCxnSpPr>
-                <p:spPr>
-                  <a:xfrm>
-                    <a:off x="3045850" y="983193"/>
-                    <a:ext cx="0" cy="343062"/>
-                  </a:xfrm>
-                  <a:prstGeom prst="line">
-                    <a:avLst/>
-                  </a:prstGeom>
-                </p:spPr>
-                <p:style>
-                  <a:lnRef idx="2">
-                    <a:schemeClr val="dk1"/>
-                  </a:lnRef>
-                  <a:fillRef idx="0">
-                    <a:schemeClr val="dk1"/>
-                  </a:fillRef>
-                  <a:effectRef idx="1">
-                    <a:schemeClr val="dk1"/>
-                  </a:effectRef>
-                  <a:fontRef idx="minor">
-                    <a:schemeClr val="tx1"/>
-                  </a:fontRef>
-                </p:style>
-              </p:cxnSp>
-              <p:cxnSp>
-                <p:nvCxnSpPr>
-                  <p:cNvPr id="128" name="Straight Connector 127">
-                    <a:extLst>
-                      <a:ext uri="{FF2B5EF4-FFF2-40B4-BE49-F238E27FC236}">
-                        <a16:creationId xmlns:a16="http://schemas.microsoft.com/office/drawing/2014/main" id="{AC9D6680-9461-A8DD-5270-7ADAE92C23C6}"/>
-                      </a:ext>
-                    </a:extLst>
-                  </p:cNvPr>
-                  <p:cNvCxnSpPr/>
-                  <p:nvPr/>
-                </p:nvCxnSpPr>
-                <p:spPr>
-                  <a:xfrm>
-                    <a:off x="3314161" y="983193"/>
-                    <a:ext cx="0" cy="343062"/>
-                  </a:xfrm>
-                  <a:prstGeom prst="line">
-                    <a:avLst/>
-                  </a:prstGeom>
-                </p:spPr>
-                <p:style>
-                  <a:lnRef idx="2">
-                    <a:schemeClr val="dk1"/>
-                  </a:lnRef>
-                  <a:fillRef idx="0">
-                    <a:schemeClr val="dk1"/>
-                  </a:fillRef>
-                  <a:effectRef idx="1">
-                    <a:schemeClr val="dk1"/>
-                  </a:effectRef>
-                  <a:fontRef idx="minor">
-                    <a:schemeClr val="tx1"/>
-                  </a:fontRef>
-                </p:style>
-              </p:cxnSp>
-              <p:cxnSp>
-                <p:nvCxnSpPr>
-                  <p:cNvPr id="129" name="Straight Connector 128">
-                    <a:extLst>
-                      <a:ext uri="{FF2B5EF4-FFF2-40B4-BE49-F238E27FC236}">
-                        <a16:creationId xmlns:a16="http://schemas.microsoft.com/office/drawing/2014/main" id="{F98E4082-B79F-9149-7742-D26765B85EBA}"/>
-                      </a:ext>
-                    </a:extLst>
-                  </p:cNvPr>
-                  <p:cNvCxnSpPr/>
-                  <p:nvPr/>
-                </p:nvCxnSpPr>
-                <p:spPr>
-                  <a:xfrm>
-                    <a:off x="6121756" y="983193"/>
-                    <a:ext cx="0" cy="343062"/>
-                  </a:xfrm>
-                  <a:prstGeom prst="line">
-                    <a:avLst/>
-                  </a:prstGeom>
-                </p:spPr>
-                <p:style>
-                  <a:lnRef idx="2">
-                    <a:schemeClr val="dk1"/>
-                  </a:lnRef>
-                  <a:fillRef idx="0">
-                    <a:schemeClr val="dk1"/>
-                  </a:fillRef>
-                  <a:effectRef idx="1">
-                    <a:schemeClr val="dk1"/>
-                  </a:effectRef>
-                  <a:fontRef idx="minor">
-                    <a:schemeClr val="tx1"/>
-                  </a:fontRef>
-                </p:style>
-              </p:cxnSp>
-              <p:cxnSp>
-                <p:nvCxnSpPr>
-                  <p:cNvPr id="130" name="Straight Connector 129">
-                    <a:extLst>
-                      <a:ext uri="{FF2B5EF4-FFF2-40B4-BE49-F238E27FC236}">
-                        <a16:creationId xmlns:a16="http://schemas.microsoft.com/office/drawing/2014/main" id="{6ABF1EB0-90B6-9B44-637C-A9E1841D5EAC}"/>
-                      </a:ext>
-                    </a:extLst>
-                  </p:cNvPr>
-                  <p:cNvCxnSpPr/>
-                  <p:nvPr/>
-                </p:nvCxnSpPr>
-                <p:spPr>
-                  <a:xfrm>
-                    <a:off x="3314161" y="983193"/>
                     <a:ext cx="2807595" cy="0"/>
                   </a:xfrm>
                   <a:prstGeom prst="line">
@@ -3342,70 +3788,214 @@
                   </a:fontRef>
                 </p:style>
               </p:cxnSp>
+              <p:grpSp>
+                <p:nvGrpSpPr>
+                  <p:cNvPr id="131" name="Group 130">
+                    <a:extLst>
+                      <a:ext uri="{FF2B5EF4-FFF2-40B4-BE49-F238E27FC236}">
+                        <a16:creationId xmlns:a16="http://schemas.microsoft.com/office/drawing/2014/main" id="{0BCD7190-3696-7E16-B8DC-B04A861CE343}"/>
+                      </a:ext>
+                    </a:extLst>
+                  </p:cNvPr>
+                  <p:cNvGrpSpPr/>
+                  <p:nvPr/>
+                </p:nvGrpSpPr>
+                <p:grpSpPr>
+                  <a:xfrm>
+                    <a:off x="238255" y="983193"/>
+                    <a:ext cx="5883501" cy="343062"/>
+                    <a:chOff x="238255" y="983193"/>
+                    <a:chExt cx="5883501" cy="343062"/>
+                  </a:xfrm>
+                </p:grpSpPr>
+                <p:cxnSp>
+                  <p:nvCxnSpPr>
+                    <p:cNvPr id="27" name="Straight Connector 26">
+                      <a:extLst>
+                        <a:ext uri="{FF2B5EF4-FFF2-40B4-BE49-F238E27FC236}">
+                          <a16:creationId xmlns:a16="http://schemas.microsoft.com/office/drawing/2014/main" id="{0124E632-8D9E-9F6E-07EA-6F32569E3758}"/>
+                        </a:ext>
+                      </a:extLst>
+                    </p:cNvPr>
+                    <p:cNvCxnSpPr/>
+                    <p:nvPr/>
+                  </p:nvCxnSpPr>
+                  <p:spPr>
+                    <a:xfrm>
+                      <a:off x="238255" y="983193"/>
+                      <a:ext cx="0" cy="343062"/>
+                    </a:xfrm>
+                    <a:prstGeom prst="line">
+                      <a:avLst/>
+                    </a:prstGeom>
+                  </p:spPr>
+                  <p:style>
+                    <a:lnRef idx="2">
+                      <a:schemeClr val="dk1"/>
+                    </a:lnRef>
+                    <a:fillRef idx="0">
+                      <a:schemeClr val="dk1"/>
+                    </a:fillRef>
+                    <a:effectRef idx="1">
+                      <a:schemeClr val="dk1"/>
+                    </a:effectRef>
+                    <a:fontRef idx="minor">
+                      <a:schemeClr val="tx1"/>
+                    </a:fontRef>
+                  </p:style>
+                </p:cxnSp>
+                <p:cxnSp>
+                  <p:nvCxnSpPr>
+                    <p:cNvPr id="28" name="Straight Connector 27">
+                      <a:extLst>
+                        <a:ext uri="{FF2B5EF4-FFF2-40B4-BE49-F238E27FC236}">
+                          <a16:creationId xmlns:a16="http://schemas.microsoft.com/office/drawing/2014/main" id="{9F01D024-0A4F-A0EC-F9F8-5E14C6AF2D1B}"/>
+                        </a:ext>
+                      </a:extLst>
+                    </p:cNvPr>
+                    <p:cNvCxnSpPr/>
+                    <p:nvPr/>
+                  </p:nvCxnSpPr>
+                  <p:spPr>
+                    <a:xfrm>
+                      <a:off x="3045850" y="983193"/>
+                      <a:ext cx="0" cy="343062"/>
+                    </a:xfrm>
+                    <a:prstGeom prst="line">
+                      <a:avLst/>
+                    </a:prstGeom>
+                  </p:spPr>
+                  <p:style>
+                    <a:lnRef idx="2">
+                      <a:schemeClr val="dk1"/>
+                    </a:lnRef>
+                    <a:fillRef idx="0">
+                      <a:schemeClr val="dk1"/>
+                    </a:fillRef>
+                    <a:effectRef idx="1">
+                      <a:schemeClr val="dk1"/>
+                    </a:effectRef>
+                    <a:fontRef idx="minor">
+                      <a:schemeClr val="tx1"/>
+                    </a:fontRef>
+                  </p:style>
+                </p:cxnSp>
+                <p:cxnSp>
+                  <p:nvCxnSpPr>
+                    <p:cNvPr id="128" name="Straight Connector 127">
+                      <a:extLst>
+                        <a:ext uri="{FF2B5EF4-FFF2-40B4-BE49-F238E27FC236}">
+                          <a16:creationId xmlns:a16="http://schemas.microsoft.com/office/drawing/2014/main" id="{AC9D6680-9461-A8DD-5270-7ADAE92C23C6}"/>
+                        </a:ext>
+                      </a:extLst>
+                    </p:cNvPr>
+                    <p:cNvCxnSpPr/>
+                    <p:nvPr/>
+                  </p:nvCxnSpPr>
+                  <p:spPr>
+                    <a:xfrm>
+                      <a:off x="3314161" y="983193"/>
+                      <a:ext cx="0" cy="343062"/>
+                    </a:xfrm>
+                    <a:prstGeom prst="line">
+                      <a:avLst/>
+                    </a:prstGeom>
+                  </p:spPr>
+                  <p:style>
+                    <a:lnRef idx="2">
+                      <a:schemeClr val="dk1"/>
+                    </a:lnRef>
+                    <a:fillRef idx="0">
+                      <a:schemeClr val="dk1"/>
+                    </a:fillRef>
+                    <a:effectRef idx="1">
+                      <a:schemeClr val="dk1"/>
+                    </a:effectRef>
+                    <a:fontRef idx="minor">
+                      <a:schemeClr val="tx1"/>
+                    </a:fontRef>
+                  </p:style>
+                </p:cxnSp>
+                <p:cxnSp>
+                  <p:nvCxnSpPr>
+                    <p:cNvPr id="129" name="Straight Connector 128">
+                      <a:extLst>
+                        <a:ext uri="{FF2B5EF4-FFF2-40B4-BE49-F238E27FC236}">
+                          <a16:creationId xmlns:a16="http://schemas.microsoft.com/office/drawing/2014/main" id="{F98E4082-B79F-9149-7742-D26765B85EBA}"/>
+                        </a:ext>
+                      </a:extLst>
+                    </p:cNvPr>
+                    <p:cNvCxnSpPr/>
+                    <p:nvPr/>
+                  </p:nvCxnSpPr>
+                  <p:spPr>
+                    <a:xfrm>
+                      <a:off x="6121756" y="983193"/>
+                      <a:ext cx="0" cy="343062"/>
+                    </a:xfrm>
+                    <a:prstGeom prst="line">
+                      <a:avLst/>
+                    </a:prstGeom>
+                  </p:spPr>
+                  <p:style>
+                    <a:lnRef idx="2">
+                      <a:schemeClr val="dk1"/>
+                    </a:lnRef>
+                    <a:fillRef idx="0">
+                      <a:schemeClr val="dk1"/>
+                    </a:fillRef>
+                    <a:effectRef idx="1">
+                      <a:schemeClr val="dk1"/>
+                    </a:effectRef>
+                    <a:fontRef idx="minor">
+                      <a:schemeClr val="tx1"/>
+                    </a:fontRef>
+                  </p:style>
+                </p:cxnSp>
+                <p:cxnSp>
+                  <p:nvCxnSpPr>
+                    <p:cNvPr id="130" name="Straight Connector 129">
+                      <a:extLst>
+                        <a:ext uri="{FF2B5EF4-FFF2-40B4-BE49-F238E27FC236}">
+                          <a16:creationId xmlns:a16="http://schemas.microsoft.com/office/drawing/2014/main" id="{6ABF1EB0-90B6-9B44-637C-A9E1841D5EAC}"/>
+                        </a:ext>
+                      </a:extLst>
+                    </p:cNvPr>
+                    <p:cNvCxnSpPr/>
+                    <p:nvPr/>
+                  </p:nvCxnSpPr>
+                  <p:spPr>
+                    <a:xfrm>
+                      <a:off x="3314161" y="983193"/>
+                      <a:ext cx="2807595" cy="0"/>
+                    </a:xfrm>
+                    <a:prstGeom prst="line">
+                      <a:avLst/>
+                    </a:prstGeom>
+                  </p:spPr>
+                  <p:style>
+                    <a:lnRef idx="2">
+                      <a:schemeClr val="dk1"/>
+                    </a:lnRef>
+                    <a:fillRef idx="0">
+                      <a:schemeClr val="dk1"/>
+                    </a:fillRef>
+                    <a:effectRef idx="1">
+                      <a:schemeClr val="dk1"/>
+                    </a:effectRef>
+                    <a:fontRef idx="minor">
+                      <a:schemeClr val="tx1"/>
+                    </a:fontRef>
+                  </p:style>
+                </p:cxnSp>
+              </p:grpSp>
             </p:grpSp>
-          </p:grpSp>
-          <p:grpSp>
-            <p:nvGrpSpPr>
-              <p:cNvPr id="139" name="Group 138">
-                <a:extLst>
-                  <a:ext uri="{FF2B5EF4-FFF2-40B4-BE49-F238E27FC236}">
-                    <a16:creationId xmlns:a16="http://schemas.microsoft.com/office/drawing/2014/main" id="{CC4EECA2-E59D-E21E-EC79-855249EA385F}"/>
-                  </a:ext>
-                </a:extLst>
-              </p:cNvPr>
-              <p:cNvGrpSpPr/>
-              <p:nvPr/>
-            </p:nvGrpSpPr>
-            <p:grpSpPr>
-              <a:xfrm>
-                <a:off x="6379334" y="983193"/>
-                <a:ext cx="5909257" cy="343062"/>
-                <a:chOff x="193182" y="983193"/>
-                <a:chExt cx="5909257" cy="343062"/>
-              </a:xfrm>
-            </p:grpSpPr>
-            <p:cxnSp>
-              <p:nvCxnSpPr>
-                <p:cNvPr id="140" name="Straight Connector 139">
+            <p:grpSp>
+              <p:nvGrpSpPr>
+                <p:cNvPr id="139" name="Group 138">
                   <a:extLst>
                     <a:ext uri="{FF2B5EF4-FFF2-40B4-BE49-F238E27FC236}">
-                      <a16:creationId xmlns:a16="http://schemas.microsoft.com/office/drawing/2014/main" id="{914E903E-C21C-E8D6-FE6B-08B21BDC7FE8}"/>
-                    </a:ext>
-                  </a:extLst>
-                </p:cNvPr>
-                <p:cNvCxnSpPr/>
-                <p:nvPr/>
-              </p:nvCxnSpPr>
-              <p:spPr>
-                <a:xfrm>
-                  <a:off x="193182" y="983193"/>
-                  <a:ext cx="2807595" cy="0"/>
-                </a:xfrm>
-                <a:prstGeom prst="line">
-                  <a:avLst/>
-                </a:prstGeom>
-              </p:spPr>
-              <p:style>
-                <a:lnRef idx="2">
-                  <a:schemeClr val="dk1"/>
-                </a:lnRef>
-                <a:fillRef idx="0">
-                  <a:schemeClr val="dk1"/>
-                </a:fillRef>
-                <a:effectRef idx="1">
-                  <a:schemeClr val="dk1"/>
-                </a:effectRef>
-                <a:fontRef idx="minor">
-                  <a:schemeClr val="tx1"/>
-                </a:fontRef>
-              </p:style>
-            </p:cxnSp>
-            <p:grpSp>
-              <p:nvGrpSpPr>
-                <p:cNvPr id="141" name="Group 140">
-                  <a:extLst>
-                    <a:ext uri="{FF2B5EF4-FFF2-40B4-BE49-F238E27FC236}">
-                      <a16:creationId xmlns:a16="http://schemas.microsoft.com/office/drawing/2014/main" id="{1198DCC4-17D8-51D6-8D3C-DB22D59558A4}"/>
+                      <a16:creationId xmlns:a16="http://schemas.microsoft.com/office/drawing/2014/main" id="{CC4EECA2-E59D-E21E-EC79-855249EA385F}"/>
                     </a:ext>
                   </a:extLst>
                 </p:cNvPr>
@@ -3414,7 +4004,7 @@
               </p:nvGrpSpPr>
               <p:grpSpPr>
                 <a:xfrm>
-                  <a:off x="193182" y="983193"/>
+                  <a:off x="6379334" y="983193"/>
                   <a:ext cx="5909257" cy="343062"/>
                   <a:chOff x="193182" y="983193"/>
                   <a:chExt cx="5909257" cy="343062"/>
@@ -3422,10 +4012,10 @@
               </p:grpSpPr>
               <p:cxnSp>
                 <p:nvCxnSpPr>
-                  <p:cNvPr id="142" name="Straight Connector 141">
+                  <p:cNvPr id="140" name="Straight Connector 139">
                     <a:extLst>
                       <a:ext uri="{FF2B5EF4-FFF2-40B4-BE49-F238E27FC236}">
-                        <a16:creationId xmlns:a16="http://schemas.microsoft.com/office/drawing/2014/main" id="{F85C6D63-5D6F-63A2-A184-A26C157F5DDE}"/>
+                        <a16:creationId xmlns:a16="http://schemas.microsoft.com/office/drawing/2014/main" id="{914E903E-C21C-E8D6-FE6B-08B21BDC7FE8}"/>
                       </a:ext>
                     </a:extLst>
                   </p:cNvPr>
@@ -3435,150 +4025,6 @@
                 <p:spPr>
                   <a:xfrm>
                     <a:off x="193182" y="983193"/>
-                    <a:ext cx="0" cy="343062"/>
-                  </a:xfrm>
-                  <a:prstGeom prst="line">
-                    <a:avLst/>
-                  </a:prstGeom>
-                </p:spPr>
-                <p:style>
-                  <a:lnRef idx="2">
-                    <a:schemeClr val="dk1"/>
-                  </a:lnRef>
-                  <a:fillRef idx="0">
-                    <a:schemeClr val="dk1"/>
-                  </a:fillRef>
-                  <a:effectRef idx="1">
-                    <a:schemeClr val="dk1"/>
-                  </a:effectRef>
-                  <a:fontRef idx="minor">
-                    <a:schemeClr val="tx1"/>
-                  </a:fontRef>
-                </p:style>
-              </p:cxnSp>
-              <p:cxnSp>
-                <p:nvCxnSpPr>
-                  <p:cNvPr id="143" name="Straight Connector 142">
-                    <a:extLst>
-                      <a:ext uri="{FF2B5EF4-FFF2-40B4-BE49-F238E27FC236}">
-                        <a16:creationId xmlns:a16="http://schemas.microsoft.com/office/drawing/2014/main" id="{669617AA-A084-43C6-B65E-8FA791154028}"/>
-                      </a:ext>
-                    </a:extLst>
-                  </p:cNvPr>
-                  <p:cNvCxnSpPr/>
-                  <p:nvPr/>
-                </p:nvCxnSpPr>
-                <p:spPr>
-                  <a:xfrm>
-                    <a:off x="3000777" y="983193"/>
-                    <a:ext cx="0" cy="343062"/>
-                  </a:xfrm>
-                  <a:prstGeom prst="line">
-                    <a:avLst/>
-                  </a:prstGeom>
-                </p:spPr>
-                <p:style>
-                  <a:lnRef idx="2">
-                    <a:schemeClr val="dk1"/>
-                  </a:lnRef>
-                  <a:fillRef idx="0">
-                    <a:schemeClr val="dk1"/>
-                  </a:fillRef>
-                  <a:effectRef idx="1">
-                    <a:schemeClr val="dk1"/>
-                  </a:effectRef>
-                  <a:fontRef idx="minor">
-                    <a:schemeClr val="tx1"/>
-                  </a:fontRef>
-                </p:style>
-              </p:cxnSp>
-              <p:cxnSp>
-                <p:nvCxnSpPr>
-                  <p:cNvPr id="144" name="Straight Connector 143">
-                    <a:extLst>
-                      <a:ext uri="{FF2B5EF4-FFF2-40B4-BE49-F238E27FC236}">
-                        <a16:creationId xmlns:a16="http://schemas.microsoft.com/office/drawing/2014/main" id="{AC40BDD6-48DD-53A1-3058-22362890BCF3}"/>
-                      </a:ext>
-                    </a:extLst>
-                  </p:cNvPr>
-                  <p:cNvCxnSpPr/>
-                  <p:nvPr/>
-                </p:nvCxnSpPr>
-                <p:spPr>
-                  <a:xfrm>
-                    <a:off x="3294844" y="983193"/>
-                    <a:ext cx="0" cy="343062"/>
-                  </a:xfrm>
-                  <a:prstGeom prst="line">
-                    <a:avLst/>
-                  </a:prstGeom>
-                </p:spPr>
-                <p:style>
-                  <a:lnRef idx="2">
-                    <a:schemeClr val="dk1"/>
-                  </a:lnRef>
-                  <a:fillRef idx="0">
-                    <a:schemeClr val="dk1"/>
-                  </a:fillRef>
-                  <a:effectRef idx="1">
-                    <a:schemeClr val="dk1"/>
-                  </a:effectRef>
-                  <a:fontRef idx="minor">
-                    <a:schemeClr val="tx1"/>
-                  </a:fontRef>
-                </p:style>
-              </p:cxnSp>
-              <p:cxnSp>
-                <p:nvCxnSpPr>
-                  <p:cNvPr id="145" name="Straight Connector 144">
-                    <a:extLst>
-                      <a:ext uri="{FF2B5EF4-FFF2-40B4-BE49-F238E27FC236}">
-                        <a16:creationId xmlns:a16="http://schemas.microsoft.com/office/drawing/2014/main" id="{A5E7BC6B-F9B5-1768-5E0C-631D9E44D16A}"/>
-                      </a:ext>
-                    </a:extLst>
-                  </p:cNvPr>
-                  <p:cNvCxnSpPr/>
-                  <p:nvPr/>
-                </p:nvCxnSpPr>
-                <p:spPr>
-                  <a:xfrm>
-                    <a:off x="6102439" y="983193"/>
-                    <a:ext cx="0" cy="343062"/>
-                  </a:xfrm>
-                  <a:prstGeom prst="line">
-                    <a:avLst/>
-                  </a:prstGeom>
-                </p:spPr>
-                <p:style>
-                  <a:lnRef idx="2">
-                    <a:schemeClr val="dk1"/>
-                  </a:lnRef>
-                  <a:fillRef idx="0">
-                    <a:schemeClr val="dk1"/>
-                  </a:fillRef>
-                  <a:effectRef idx="1">
-                    <a:schemeClr val="dk1"/>
-                  </a:effectRef>
-                  <a:fontRef idx="minor">
-                    <a:schemeClr val="tx1"/>
-                  </a:fontRef>
-                </p:style>
-              </p:cxnSp>
-              <p:cxnSp>
-                <p:nvCxnSpPr>
-                  <p:cNvPr id="146" name="Straight Connector 145">
-                    <a:extLst>
-                      <a:ext uri="{FF2B5EF4-FFF2-40B4-BE49-F238E27FC236}">
-                        <a16:creationId xmlns:a16="http://schemas.microsoft.com/office/drawing/2014/main" id="{24C2CF73-9275-EBF2-74A1-7CDE647A4821}"/>
-                      </a:ext>
-                    </a:extLst>
-                  </p:cNvPr>
-                  <p:cNvCxnSpPr/>
-                  <p:nvPr/>
-                </p:nvCxnSpPr>
-                <p:spPr>
-                  <a:xfrm>
-                    <a:off x="3294844" y="983193"/>
                     <a:ext cx="2807595" cy="0"/>
                   </a:xfrm>
                   <a:prstGeom prst="line">
@@ -3600,164 +4046,400 @@
                   </a:fontRef>
                 </p:style>
               </p:cxnSp>
+              <p:grpSp>
+                <p:nvGrpSpPr>
+                  <p:cNvPr id="141" name="Group 140">
+                    <a:extLst>
+                      <a:ext uri="{FF2B5EF4-FFF2-40B4-BE49-F238E27FC236}">
+                        <a16:creationId xmlns:a16="http://schemas.microsoft.com/office/drawing/2014/main" id="{1198DCC4-17D8-51D6-8D3C-DB22D59558A4}"/>
+                      </a:ext>
+                    </a:extLst>
+                  </p:cNvPr>
+                  <p:cNvGrpSpPr/>
+                  <p:nvPr/>
+                </p:nvGrpSpPr>
+                <p:grpSpPr>
+                  <a:xfrm>
+                    <a:off x="193182" y="983193"/>
+                    <a:ext cx="5909257" cy="343062"/>
+                    <a:chOff x="193182" y="983193"/>
+                    <a:chExt cx="5909257" cy="343062"/>
+                  </a:xfrm>
+                </p:grpSpPr>
+                <p:cxnSp>
+                  <p:nvCxnSpPr>
+                    <p:cNvPr id="142" name="Straight Connector 141">
+                      <a:extLst>
+                        <a:ext uri="{FF2B5EF4-FFF2-40B4-BE49-F238E27FC236}">
+                          <a16:creationId xmlns:a16="http://schemas.microsoft.com/office/drawing/2014/main" id="{F85C6D63-5D6F-63A2-A184-A26C157F5DDE}"/>
+                        </a:ext>
+                      </a:extLst>
+                    </p:cNvPr>
+                    <p:cNvCxnSpPr/>
+                    <p:nvPr/>
+                  </p:nvCxnSpPr>
+                  <p:spPr>
+                    <a:xfrm>
+                      <a:off x="193182" y="983193"/>
+                      <a:ext cx="0" cy="343062"/>
+                    </a:xfrm>
+                    <a:prstGeom prst="line">
+                      <a:avLst/>
+                    </a:prstGeom>
+                  </p:spPr>
+                  <p:style>
+                    <a:lnRef idx="2">
+                      <a:schemeClr val="dk1"/>
+                    </a:lnRef>
+                    <a:fillRef idx="0">
+                      <a:schemeClr val="dk1"/>
+                    </a:fillRef>
+                    <a:effectRef idx="1">
+                      <a:schemeClr val="dk1"/>
+                    </a:effectRef>
+                    <a:fontRef idx="minor">
+                      <a:schemeClr val="tx1"/>
+                    </a:fontRef>
+                  </p:style>
+                </p:cxnSp>
+                <p:cxnSp>
+                  <p:nvCxnSpPr>
+                    <p:cNvPr id="143" name="Straight Connector 142">
+                      <a:extLst>
+                        <a:ext uri="{FF2B5EF4-FFF2-40B4-BE49-F238E27FC236}">
+                          <a16:creationId xmlns:a16="http://schemas.microsoft.com/office/drawing/2014/main" id="{669617AA-A084-43C6-B65E-8FA791154028}"/>
+                        </a:ext>
+                      </a:extLst>
+                    </p:cNvPr>
+                    <p:cNvCxnSpPr/>
+                    <p:nvPr/>
+                  </p:nvCxnSpPr>
+                  <p:spPr>
+                    <a:xfrm>
+                      <a:off x="3000777" y="983193"/>
+                      <a:ext cx="0" cy="343062"/>
+                    </a:xfrm>
+                    <a:prstGeom prst="line">
+                      <a:avLst/>
+                    </a:prstGeom>
+                  </p:spPr>
+                  <p:style>
+                    <a:lnRef idx="2">
+                      <a:schemeClr val="dk1"/>
+                    </a:lnRef>
+                    <a:fillRef idx="0">
+                      <a:schemeClr val="dk1"/>
+                    </a:fillRef>
+                    <a:effectRef idx="1">
+                      <a:schemeClr val="dk1"/>
+                    </a:effectRef>
+                    <a:fontRef idx="minor">
+                      <a:schemeClr val="tx1"/>
+                    </a:fontRef>
+                  </p:style>
+                </p:cxnSp>
+                <p:cxnSp>
+                  <p:nvCxnSpPr>
+                    <p:cNvPr id="144" name="Straight Connector 143">
+                      <a:extLst>
+                        <a:ext uri="{FF2B5EF4-FFF2-40B4-BE49-F238E27FC236}">
+                          <a16:creationId xmlns:a16="http://schemas.microsoft.com/office/drawing/2014/main" id="{AC40BDD6-48DD-53A1-3058-22362890BCF3}"/>
+                        </a:ext>
+                      </a:extLst>
+                    </p:cNvPr>
+                    <p:cNvCxnSpPr/>
+                    <p:nvPr/>
+                  </p:nvCxnSpPr>
+                  <p:spPr>
+                    <a:xfrm>
+                      <a:off x="3294844" y="983193"/>
+                      <a:ext cx="0" cy="343062"/>
+                    </a:xfrm>
+                    <a:prstGeom prst="line">
+                      <a:avLst/>
+                    </a:prstGeom>
+                  </p:spPr>
+                  <p:style>
+                    <a:lnRef idx="2">
+                      <a:schemeClr val="dk1"/>
+                    </a:lnRef>
+                    <a:fillRef idx="0">
+                      <a:schemeClr val="dk1"/>
+                    </a:fillRef>
+                    <a:effectRef idx="1">
+                      <a:schemeClr val="dk1"/>
+                    </a:effectRef>
+                    <a:fontRef idx="minor">
+                      <a:schemeClr val="tx1"/>
+                    </a:fontRef>
+                  </p:style>
+                </p:cxnSp>
+                <p:cxnSp>
+                  <p:nvCxnSpPr>
+                    <p:cNvPr id="145" name="Straight Connector 144">
+                      <a:extLst>
+                        <a:ext uri="{FF2B5EF4-FFF2-40B4-BE49-F238E27FC236}">
+                          <a16:creationId xmlns:a16="http://schemas.microsoft.com/office/drawing/2014/main" id="{A5E7BC6B-F9B5-1768-5E0C-631D9E44D16A}"/>
+                        </a:ext>
+                      </a:extLst>
+                    </p:cNvPr>
+                    <p:cNvCxnSpPr/>
+                    <p:nvPr/>
+                  </p:nvCxnSpPr>
+                  <p:spPr>
+                    <a:xfrm>
+                      <a:off x="6102439" y="983193"/>
+                      <a:ext cx="0" cy="343062"/>
+                    </a:xfrm>
+                    <a:prstGeom prst="line">
+                      <a:avLst/>
+                    </a:prstGeom>
+                  </p:spPr>
+                  <p:style>
+                    <a:lnRef idx="2">
+                      <a:schemeClr val="dk1"/>
+                    </a:lnRef>
+                    <a:fillRef idx="0">
+                      <a:schemeClr val="dk1"/>
+                    </a:fillRef>
+                    <a:effectRef idx="1">
+                      <a:schemeClr val="dk1"/>
+                    </a:effectRef>
+                    <a:fontRef idx="minor">
+                      <a:schemeClr val="tx1"/>
+                    </a:fontRef>
+                  </p:style>
+                </p:cxnSp>
+                <p:cxnSp>
+                  <p:nvCxnSpPr>
+                    <p:cNvPr id="146" name="Straight Connector 145">
+                      <a:extLst>
+                        <a:ext uri="{FF2B5EF4-FFF2-40B4-BE49-F238E27FC236}">
+                          <a16:creationId xmlns:a16="http://schemas.microsoft.com/office/drawing/2014/main" id="{24C2CF73-9275-EBF2-74A1-7CDE647A4821}"/>
+                        </a:ext>
+                      </a:extLst>
+                    </p:cNvPr>
+                    <p:cNvCxnSpPr/>
+                    <p:nvPr/>
+                  </p:nvCxnSpPr>
+                  <p:spPr>
+                    <a:xfrm>
+                      <a:off x="3294844" y="983193"/>
+                      <a:ext cx="2807595" cy="0"/>
+                    </a:xfrm>
+                    <a:prstGeom prst="line">
+                      <a:avLst/>
+                    </a:prstGeom>
+                  </p:spPr>
+                  <p:style>
+                    <a:lnRef idx="2">
+                      <a:schemeClr val="dk1"/>
+                    </a:lnRef>
+                    <a:fillRef idx="0">
+                      <a:schemeClr val="dk1"/>
+                    </a:fillRef>
+                    <a:effectRef idx="1">
+                      <a:schemeClr val="dk1"/>
+                    </a:effectRef>
+                    <a:fontRef idx="minor">
+                      <a:schemeClr val="tx1"/>
+                    </a:fontRef>
+                  </p:style>
+                </p:cxnSp>
+              </p:grpSp>
             </p:grpSp>
+            <p:sp>
+              <p:nvSpPr>
+                <p:cNvPr id="147" name="TextBox 146">
+                  <a:extLst>
+                    <a:ext uri="{FF2B5EF4-FFF2-40B4-BE49-F238E27FC236}">
+                      <a16:creationId xmlns:a16="http://schemas.microsoft.com/office/drawing/2014/main" id="{1FB90628-16D8-1BE2-D13B-F8491AED6AF9}"/>
+                    </a:ext>
+                  </a:extLst>
+                </p:cNvPr>
+                <p:cNvSpPr txBox="1"/>
+                <p:nvPr/>
+              </p:nvSpPr>
+              <p:spPr>
+                <a:xfrm>
+                  <a:off x="837184" y="600726"/>
+                  <a:ext cx="1662635" cy="369332"/>
+                </a:xfrm>
+                <a:prstGeom prst="rect">
+                  <a:avLst/>
+                </a:prstGeom>
+                <a:noFill/>
+              </p:spPr>
+              <p:txBody>
+                <a:bodyPr wrap="none" rtlCol="0">
+                  <a:spAutoFit/>
+                </a:bodyPr>
+                <a:lstStyle/>
+                <a:p>
+                  <a:r>
+                    <a:rPr lang="en-US" dirty="0"/>
+                    <a:t>↑↑ ASC 70min</a:t>
+                  </a:r>
+                </a:p>
+              </p:txBody>
+            </p:sp>
+            <p:sp>
+              <p:nvSpPr>
+                <p:cNvPr id="148" name="TextBox 147">
+                  <a:extLst>
+                    <a:ext uri="{FF2B5EF4-FFF2-40B4-BE49-F238E27FC236}">
+                      <a16:creationId xmlns:a16="http://schemas.microsoft.com/office/drawing/2014/main" id="{FB770CE7-813D-7BDB-5870-E6F8D68C4E28}"/>
+                    </a:ext>
+                  </a:extLst>
+                </p:cNvPr>
+                <p:cNvSpPr txBox="1"/>
+                <p:nvPr/>
+              </p:nvSpPr>
+              <p:spPr>
+                <a:xfrm>
+                  <a:off x="7005961" y="632668"/>
+                  <a:ext cx="1558440" cy="369332"/>
+                </a:xfrm>
+                <a:prstGeom prst="rect">
+                  <a:avLst/>
+                </a:prstGeom>
+                <a:noFill/>
+              </p:spPr>
+              <p:txBody>
+                <a:bodyPr wrap="none" rtlCol="0">
+                  <a:spAutoFit/>
+                </a:bodyPr>
+                <a:lstStyle/>
+                <a:p>
+                  <a:r>
+                    <a:rPr lang="en-US" dirty="0"/>
+                    <a:t>↑↑ ASC 25hr </a:t>
+                  </a:r>
+                </a:p>
+              </p:txBody>
+            </p:sp>
+            <p:sp>
+              <p:nvSpPr>
+                <p:cNvPr id="149" name="TextBox 148">
+                  <a:extLst>
+                    <a:ext uri="{FF2B5EF4-FFF2-40B4-BE49-F238E27FC236}">
+                      <a16:creationId xmlns:a16="http://schemas.microsoft.com/office/drawing/2014/main" id="{C7ED245F-B33B-CA7E-F51E-5D59E3E20079}"/>
+                    </a:ext>
+                  </a:extLst>
+                </p:cNvPr>
+                <p:cNvSpPr txBox="1"/>
+                <p:nvPr/>
+              </p:nvSpPr>
+              <p:spPr>
+                <a:xfrm>
+                  <a:off x="3950452" y="600442"/>
+                  <a:ext cx="1662635" cy="369332"/>
+                </a:xfrm>
+                <a:prstGeom prst="rect">
+                  <a:avLst/>
+                </a:prstGeom>
+                <a:noFill/>
+              </p:spPr>
+              <p:txBody>
+                <a:bodyPr wrap="square" rtlCol="0">
+                  <a:spAutoFit/>
+                </a:bodyPr>
+                <a:lstStyle/>
+                <a:p>
+                  <a:r>
+                    <a:rPr lang="en-US" dirty="0"/>
+                    <a:t>↓↓ ASC 70min</a:t>
+                  </a:r>
+                </a:p>
+              </p:txBody>
+            </p:sp>
+            <p:sp>
+              <p:nvSpPr>
+                <p:cNvPr id="150" name="TextBox 149">
+                  <a:extLst>
+                    <a:ext uri="{FF2B5EF4-FFF2-40B4-BE49-F238E27FC236}">
+                      <a16:creationId xmlns:a16="http://schemas.microsoft.com/office/drawing/2014/main" id="{1C0127A3-71DD-B8F8-640D-1AB24EA41E9F}"/>
+                    </a:ext>
+                  </a:extLst>
+                </p:cNvPr>
+                <p:cNvSpPr txBox="1"/>
+                <p:nvPr/>
+              </p:nvSpPr>
+              <p:spPr>
+                <a:xfrm>
+                  <a:off x="10053475" y="600442"/>
+                  <a:ext cx="1662635" cy="369332"/>
+                </a:xfrm>
+                <a:prstGeom prst="rect">
+                  <a:avLst/>
+                </a:prstGeom>
+                <a:noFill/>
+              </p:spPr>
+              <p:txBody>
+                <a:bodyPr wrap="square" rtlCol="0">
+                  <a:spAutoFit/>
+                </a:bodyPr>
+                <a:lstStyle/>
+                <a:p>
+                  <a:r>
+                    <a:rPr lang="en-US" dirty="0"/>
+                    <a:t>↓↓ ASC 25 </a:t>
+                  </a:r>
+                  <a:r>
+                    <a:rPr lang="en-US" dirty="0" err="1"/>
+                    <a:t>hr</a:t>
+                  </a:r>
+                  <a:r>
+                    <a:rPr lang="en-US" dirty="0"/>
+                    <a:t> </a:t>
+                  </a:r>
+                </a:p>
+              </p:txBody>
+            </p:sp>
           </p:grpSp>
-          <p:sp>
-            <p:nvSpPr>
-              <p:cNvPr id="147" name="TextBox 146">
-                <a:extLst>
-                  <a:ext uri="{FF2B5EF4-FFF2-40B4-BE49-F238E27FC236}">
-                    <a16:creationId xmlns:a16="http://schemas.microsoft.com/office/drawing/2014/main" id="{1FB90628-16D8-1BE2-D13B-F8491AED6AF9}"/>
-                  </a:ext>
-                </a:extLst>
-              </p:cNvPr>
-              <p:cNvSpPr txBox="1"/>
-              <p:nvPr/>
-            </p:nvSpPr>
-            <p:spPr>
-              <a:xfrm>
-                <a:off x="837184" y="600726"/>
-                <a:ext cx="1662635" cy="369332"/>
-              </a:xfrm>
-              <a:prstGeom prst="rect">
-                <a:avLst/>
-              </a:prstGeom>
-              <a:noFill/>
-            </p:spPr>
-            <p:txBody>
-              <a:bodyPr wrap="none" rtlCol="0">
-                <a:spAutoFit/>
-              </a:bodyPr>
-              <a:lstStyle/>
-              <a:p>
-                <a:r>
-                  <a:rPr lang="en-US" dirty="0"/>
-                  <a:t>↑↑ ASC 70min</a:t>
-                </a:r>
-              </a:p>
-            </p:txBody>
-          </p:sp>
-          <p:sp>
-            <p:nvSpPr>
-              <p:cNvPr id="148" name="TextBox 147">
-                <a:extLst>
-                  <a:ext uri="{FF2B5EF4-FFF2-40B4-BE49-F238E27FC236}">
-                    <a16:creationId xmlns:a16="http://schemas.microsoft.com/office/drawing/2014/main" id="{FB770CE7-813D-7BDB-5870-E6F8D68C4E28}"/>
-                  </a:ext>
-                </a:extLst>
-              </p:cNvPr>
-              <p:cNvSpPr txBox="1"/>
-              <p:nvPr/>
-            </p:nvSpPr>
-            <p:spPr>
-              <a:xfrm>
-                <a:off x="7005961" y="632668"/>
-                <a:ext cx="1558440" cy="369332"/>
-              </a:xfrm>
-              <a:prstGeom prst="rect">
-                <a:avLst/>
-              </a:prstGeom>
-              <a:noFill/>
-            </p:spPr>
-            <p:txBody>
-              <a:bodyPr wrap="none" rtlCol="0">
-                <a:spAutoFit/>
-              </a:bodyPr>
-              <a:lstStyle/>
-              <a:p>
-                <a:r>
-                  <a:rPr lang="en-US" dirty="0"/>
-                  <a:t>↑↑ ASC 25hr </a:t>
-                </a:r>
-              </a:p>
-            </p:txBody>
-          </p:sp>
-          <p:sp>
-            <p:nvSpPr>
-              <p:cNvPr id="149" name="TextBox 148">
-                <a:extLst>
-                  <a:ext uri="{FF2B5EF4-FFF2-40B4-BE49-F238E27FC236}">
-                    <a16:creationId xmlns:a16="http://schemas.microsoft.com/office/drawing/2014/main" id="{C7ED245F-B33B-CA7E-F51E-5D59E3E20079}"/>
-                  </a:ext>
-                </a:extLst>
-              </p:cNvPr>
-              <p:cNvSpPr txBox="1"/>
-              <p:nvPr/>
-            </p:nvSpPr>
-            <p:spPr>
-              <a:xfrm>
-                <a:off x="3950452" y="600442"/>
-                <a:ext cx="1662635" cy="369332"/>
-              </a:xfrm>
-              <a:prstGeom prst="rect">
-                <a:avLst/>
-              </a:prstGeom>
-              <a:noFill/>
-            </p:spPr>
-            <p:txBody>
-              <a:bodyPr wrap="square" rtlCol="0">
-                <a:spAutoFit/>
-              </a:bodyPr>
-              <a:lstStyle/>
-              <a:p>
-                <a:r>
-                  <a:rPr lang="en-US" dirty="0"/>
-                  <a:t>↓↓ ASC 70min</a:t>
-                </a:r>
-              </a:p>
-            </p:txBody>
-          </p:sp>
-          <p:sp>
-            <p:nvSpPr>
-              <p:cNvPr id="150" name="TextBox 149">
-                <a:extLst>
-                  <a:ext uri="{FF2B5EF4-FFF2-40B4-BE49-F238E27FC236}">
-                    <a16:creationId xmlns:a16="http://schemas.microsoft.com/office/drawing/2014/main" id="{1C0127A3-71DD-B8F8-640D-1AB24EA41E9F}"/>
-                  </a:ext>
-                </a:extLst>
-              </p:cNvPr>
-              <p:cNvSpPr txBox="1"/>
-              <p:nvPr/>
-            </p:nvSpPr>
-            <p:spPr>
-              <a:xfrm>
-                <a:off x="10053475" y="600442"/>
-                <a:ext cx="1662635" cy="369332"/>
-              </a:xfrm>
-              <a:prstGeom prst="rect">
-                <a:avLst/>
-              </a:prstGeom>
-              <a:noFill/>
-            </p:spPr>
-            <p:txBody>
-              <a:bodyPr wrap="square" rtlCol="0">
-                <a:spAutoFit/>
-              </a:bodyPr>
-              <a:lstStyle/>
-              <a:p>
-                <a:r>
-                  <a:rPr lang="en-US" dirty="0"/>
-                  <a:t>↓↓ ASC 25 </a:t>
-                </a:r>
-                <a:r>
-                  <a:rPr lang="en-US" dirty="0" err="1"/>
-                  <a:t>hr</a:t>
-                </a:r>
-                <a:r>
-                  <a:rPr lang="en-US" dirty="0"/>
-                  <a:t> </a:t>
-                </a:r>
-              </a:p>
-            </p:txBody>
-          </p:sp>
         </p:grpSp>
+        <p:sp>
+          <p:nvSpPr>
+            <p:cNvPr id="195" name="TextBox 194">
+              <a:extLst>
+                <a:ext uri="{FF2B5EF4-FFF2-40B4-BE49-F238E27FC236}">
+                  <a16:creationId xmlns:a16="http://schemas.microsoft.com/office/drawing/2014/main" id="{6A8B9CB4-8E31-A9DC-FE01-5F6878C3230A}"/>
+                </a:ext>
+              </a:extLst>
+            </p:cNvPr>
+            <p:cNvSpPr txBox="1"/>
+            <p:nvPr/>
+          </p:nvSpPr>
+          <p:spPr>
+            <a:xfrm>
+              <a:off x="0" y="188252"/>
+              <a:ext cx="455574" cy="461665"/>
+            </a:xfrm>
+            <a:prstGeom prst="rect">
+              <a:avLst/>
+            </a:prstGeom>
+            <a:noFill/>
+          </p:spPr>
+          <p:txBody>
+            <a:bodyPr wrap="none" rtlCol="0">
+              <a:spAutoFit/>
+            </a:bodyPr>
+            <a:lstStyle/>
+            <a:p>
+              <a:r>
+                <a:rPr lang="en-US" sz="2400" dirty="0"/>
+                <a:t>A)</a:t>
+              </a:r>
+            </a:p>
+          </p:txBody>
+        </p:sp>
       </p:grpSp>
       <p:grpSp>
         <p:nvGrpSpPr>
-          <p:cNvPr id="193" name="Group 192">
+          <p:cNvPr id="38" name="Group 37">
             <a:extLst>
               <a:ext uri="{FF2B5EF4-FFF2-40B4-BE49-F238E27FC236}">
-                <a16:creationId xmlns:a16="http://schemas.microsoft.com/office/drawing/2014/main" id="{04652617-BA58-DC85-3B7E-19A56BCA4E6A}"/>
+                <a16:creationId xmlns:a16="http://schemas.microsoft.com/office/drawing/2014/main" id="{AE09E66A-E5E1-FF19-8E9D-67AC9E85B8A1}"/>
               </a:ext>
             </a:extLst>
           </p:cNvPr>
@@ -3766,54 +4448,18 @@
         </p:nvGrpSpPr>
         <p:grpSpPr>
           <a:xfrm>
-            <a:off x="0" y="4039566"/>
-            <a:ext cx="13716000" cy="2595809"/>
-            <a:chOff x="0" y="3917216"/>
-            <a:chExt cx="13716000" cy="2595809"/>
+            <a:off x="405246" y="3665858"/>
+            <a:ext cx="13819908" cy="2839825"/>
+            <a:chOff x="11222" y="3676262"/>
+            <a:chExt cx="13819908" cy="2839825"/>
           </a:xfrm>
         </p:grpSpPr>
-        <p:pic>
-          <p:nvPicPr>
-            <p:cNvPr id="106" name="Picture 105">
+        <p:grpSp>
+          <p:nvGrpSpPr>
+            <p:cNvPr id="35" name="Group 34">
               <a:extLst>
                 <a:ext uri="{FF2B5EF4-FFF2-40B4-BE49-F238E27FC236}">
-                  <a16:creationId xmlns:a16="http://schemas.microsoft.com/office/drawing/2014/main" id="{F2A05DD9-5DA3-8A8C-95FF-8D26EEDAF9E1}"/>
-                </a:ext>
-              </a:extLst>
-            </p:cNvPr>
-            <p:cNvPicPr>
-              <a:picLocks noChangeAspect="1"/>
-            </p:cNvPicPr>
-            <p:nvPr/>
-          </p:nvPicPr>
-          <p:blipFill>
-            <a:blip r:embed="rId3">
-              <a:extLst>
-                <a:ext uri="{28A0092B-C50C-407E-A947-70E740481C1C}">
-                  <a14:useLocalDpi xmlns:a14="http://schemas.microsoft.com/office/drawing/2010/main" val="0"/>
-                </a:ext>
-              </a:extLst>
-            </a:blip>
-            <a:stretch>
-              <a:fillRect/>
-            </a:stretch>
-          </p:blipFill>
-          <p:spPr>
-            <a:xfrm>
-              <a:off x="0" y="4608025"/>
-              <a:ext cx="13716000" cy="1905000"/>
-            </a:xfrm>
-            <a:prstGeom prst="rect">
-              <a:avLst/>
-            </a:prstGeom>
-          </p:spPr>
-        </p:pic>
-        <p:grpSp>
-          <p:nvGrpSpPr>
-            <p:cNvPr id="172" name="Group 171">
-              <a:extLst>
-                <a:ext uri="{FF2B5EF4-FFF2-40B4-BE49-F238E27FC236}">
-                  <a16:creationId xmlns:a16="http://schemas.microsoft.com/office/drawing/2014/main" id="{A280A489-3BD4-332C-74B1-1B1BE94314F6}"/>
+                  <a16:creationId xmlns:a16="http://schemas.microsoft.com/office/drawing/2014/main" id="{C2B815F7-10A8-6F79-6655-BD9A8FF08AB8}"/>
                 </a:ext>
               </a:extLst>
             </p:cNvPr>
@@ -3822,18 +4468,48 @@
           </p:nvGrpSpPr>
           <p:grpSpPr>
             <a:xfrm>
-              <a:off x="218938" y="3917216"/>
-              <a:ext cx="12069653" cy="725813"/>
-              <a:chOff x="238255" y="600442"/>
-              <a:chExt cx="12069653" cy="725813"/>
+              <a:off x="115130" y="3907094"/>
+              <a:ext cx="13716000" cy="2608993"/>
+              <a:chOff x="194097" y="3953261"/>
+              <a:chExt cx="13716000" cy="2608993"/>
             </a:xfrm>
           </p:grpSpPr>
+          <p:pic>
+            <p:nvPicPr>
+              <p:cNvPr id="7" name="Picture 6">
+                <a:extLst>
+                  <a:ext uri="{FF2B5EF4-FFF2-40B4-BE49-F238E27FC236}">
+                    <a16:creationId xmlns:a16="http://schemas.microsoft.com/office/drawing/2014/main" id="{17CB3543-FFB0-E8CD-26E2-E443F27D3BFB}"/>
+                  </a:ext>
+                </a:extLst>
+              </p:cNvPr>
+              <p:cNvPicPr>
+                <a:picLocks noChangeAspect="1"/>
+              </p:cNvPicPr>
+              <p:nvPr/>
+            </p:nvPicPr>
+            <p:blipFill>
+              <a:blip r:embed="rId3"/>
+              <a:stretch>
+                <a:fillRect/>
+              </a:stretch>
+            </p:blipFill>
+            <p:spPr>
+              <a:xfrm>
+                <a:off x="194097" y="4657254"/>
+                <a:ext cx="13716000" cy="1905000"/>
+              </a:xfrm>
+              <a:prstGeom prst="rect">
+                <a:avLst/>
+              </a:prstGeom>
+            </p:spPr>
+          </p:pic>
           <p:grpSp>
             <p:nvGrpSpPr>
-              <p:cNvPr id="173" name="Group 172">
+              <p:cNvPr id="172" name="Group 171">
                 <a:extLst>
                   <a:ext uri="{FF2B5EF4-FFF2-40B4-BE49-F238E27FC236}">
-                    <a16:creationId xmlns:a16="http://schemas.microsoft.com/office/drawing/2014/main" id="{CD6747E6-A769-CBE6-0F36-53D3D190D37A}"/>
+                    <a16:creationId xmlns:a16="http://schemas.microsoft.com/office/drawing/2014/main" id="{A280A489-3BD4-332C-74B1-1B1BE94314F6}"/>
                   </a:ext>
                 </a:extLst>
               </p:cNvPr>
@@ -3842,54 +4518,18 @@
             </p:nvGrpSpPr>
             <p:grpSpPr>
               <a:xfrm>
-                <a:off x="238255" y="983193"/>
-                <a:ext cx="5883501" cy="343062"/>
-                <a:chOff x="238255" y="983193"/>
-                <a:chExt cx="5883501" cy="343062"/>
+                <a:off x="444352" y="3953261"/>
+                <a:ext cx="12069653" cy="725813"/>
+                <a:chOff x="238255" y="600442"/>
+                <a:chExt cx="12069653" cy="725813"/>
               </a:xfrm>
             </p:grpSpPr>
-            <p:cxnSp>
-              <p:nvCxnSpPr>
-                <p:cNvPr id="186" name="Straight Connector 185">
+            <p:grpSp>
+              <p:nvGrpSpPr>
+                <p:cNvPr id="173" name="Group 172">
                   <a:extLst>
                     <a:ext uri="{FF2B5EF4-FFF2-40B4-BE49-F238E27FC236}">
-                      <a16:creationId xmlns:a16="http://schemas.microsoft.com/office/drawing/2014/main" id="{E22018D7-4E57-5014-2DBD-CC6EEE2BE92F}"/>
-                    </a:ext>
-                  </a:extLst>
-                </p:cNvPr>
-                <p:cNvCxnSpPr/>
-                <p:nvPr/>
-              </p:nvCxnSpPr>
-              <p:spPr>
-                <a:xfrm>
-                  <a:off x="238255" y="983193"/>
-                  <a:ext cx="2807595" cy="0"/>
-                </a:xfrm>
-                <a:prstGeom prst="line">
-                  <a:avLst/>
-                </a:prstGeom>
-              </p:spPr>
-              <p:style>
-                <a:lnRef idx="2">
-                  <a:schemeClr val="dk1"/>
-                </a:lnRef>
-                <a:fillRef idx="0">
-                  <a:schemeClr val="dk1"/>
-                </a:fillRef>
-                <a:effectRef idx="1">
-                  <a:schemeClr val="dk1"/>
-                </a:effectRef>
-                <a:fontRef idx="minor">
-                  <a:schemeClr val="tx1"/>
-                </a:fontRef>
-              </p:style>
-            </p:cxnSp>
-            <p:grpSp>
-              <p:nvGrpSpPr>
-                <p:cNvPr id="187" name="Group 186">
-                  <a:extLst>
-                    <a:ext uri="{FF2B5EF4-FFF2-40B4-BE49-F238E27FC236}">
-                      <a16:creationId xmlns:a16="http://schemas.microsoft.com/office/drawing/2014/main" id="{0E48CBE7-28DD-3996-E9FD-48617922D45D}"/>
+                      <a16:creationId xmlns:a16="http://schemas.microsoft.com/office/drawing/2014/main" id="{CD6747E6-A769-CBE6-0F36-53D3D190D37A}"/>
                     </a:ext>
                   </a:extLst>
                 </p:cNvPr>
@@ -3906,10 +4546,10 @@
               </p:grpSpPr>
               <p:cxnSp>
                 <p:nvCxnSpPr>
-                  <p:cNvPr id="188" name="Straight Connector 187">
+                  <p:cNvPr id="186" name="Straight Connector 185">
                     <a:extLst>
                       <a:ext uri="{FF2B5EF4-FFF2-40B4-BE49-F238E27FC236}">
-                        <a16:creationId xmlns:a16="http://schemas.microsoft.com/office/drawing/2014/main" id="{894C9A55-7122-94DB-B627-BFCC96BF4DFD}"/>
+                        <a16:creationId xmlns:a16="http://schemas.microsoft.com/office/drawing/2014/main" id="{E22018D7-4E57-5014-2DBD-CC6EEE2BE92F}"/>
                       </a:ext>
                     </a:extLst>
                   </p:cNvPr>
@@ -3919,150 +4559,6 @@
                 <p:spPr>
                   <a:xfrm>
                     <a:off x="238255" y="983193"/>
-                    <a:ext cx="0" cy="343062"/>
-                  </a:xfrm>
-                  <a:prstGeom prst="line">
-                    <a:avLst/>
-                  </a:prstGeom>
-                </p:spPr>
-                <p:style>
-                  <a:lnRef idx="2">
-                    <a:schemeClr val="dk1"/>
-                  </a:lnRef>
-                  <a:fillRef idx="0">
-                    <a:schemeClr val="dk1"/>
-                  </a:fillRef>
-                  <a:effectRef idx="1">
-                    <a:schemeClr val="dk1"/>
-                  </a:effectRef>
-                  <a:fontRef idx="minor">
-                    <a:schemeClr val="tx1"/>
-                  </a:fontRef>
-                </p:style>
-              </p:cxnSp>
-              <p:cxnSp>
-                <p:nvCxnSpPr>
-                  <p:cNvPr id="189" name="Straight Connector 188">
-                    <a:extLst>
-                      <a:ext uri="{FF2B5EF4-FFF2-40B4-BE49-F238E27FC236}">
-                        <a16:creationId xmlns:a16="http://schemas.microsoft.com/office/drawing/2014/main" id="{CD66530D-B9B6-9952-4018-D6D291BE4CCB}"/>
-                      </a:ext>
-                    </a:extLst>
-                  </p:cNvPr>
-                  <p:cNvCxnSpPr/>
-                  <p:nvPr/>
-                </p:nvCxnSpPr>
-                <p:spPr>
-                  <a:xfrm>
-                    <a:off x="3045850" y="983193"/>
-                    <a:ext cx="0" cy="343062"/>
-                  </a:xfrm>
-                  <a:prstGeom prst="line">
-                    <a:avLst/>
-                  </a:prstGeom>
-                </p:spPr>
-                <p:style>
-                  <a:lnRef idx="2">
-                    <a:schemeClr val="dk1"/>
-                  </a:lnRef>
-                  <a:fillRef idx="0">
-                    <a:schemeClr val="dk1"/>
-                  </a:fillRef>
-                  <a:effectRef idx="1">
-                    <a:schemeClr val="dk1"/>
-                  </a:effectRef>
-                  <a:fontRef idx="minor">
-                    <a:schemeClr val="tx1"/>
-                  </a:fontRef>
-                </p:style>
-              </p:cxnSp>
-              <p:cxnSp>
-                <p:nvCxnSpPr>
-                  <p:cNvPr id="190" name="Straight Connector 189">
-                    <a:extLst>
-                      <a:ext uri="{FF2B5EF4-FFF2-40B4-BE49-F238E27FC236}">
-                        <a16:creationId xmlns:a16="http://schemas.microsoft.com/office/drawing/2014/main" id="{20E9C813-2585-3092-315E-264E8C843F66}"/>
-                      </a:ext>
-                    </a:extLst>
-                  </p:cNvPr>
-                  <p:cNvCxnSpPr/>
-                  <p:nvPr/>
-                </p:nvCxnSpPr>
-                <p:spPr>
-                  <a:xfrm>
-                    <a:off x="3314161" y="983193"/>
-                    <a:ext cx="0" cy="343062"/>
-                  </a:xfrm>
-                  <a:prstGeom prst="line">
-                    <a:avLst/>
-                  </a:prstGeom>
-                </p:spPr>
-                <p:style>
-                  <a:lnRef idx="2">
-                    <a:schemeClr val="dk1"/>
-                  </a:lnRef>
-                  <a:fillRef idx="0">
-                    <a:schemeClr val="dk1"/>
-                  </a:fillRef>
-                  <a:effectRef idx="1">
-                    <a:schemeClr val="dk1"/>
-                  </a:effectRef>
-                  <a:fontRef idx="minor">
-                    <a:schemeClr val="tx1"/>
-                  </a:fontRef>
-                </p:style>
-              </p:cxnSp>
-              <p:cxnSp>
-                <p:nvCxnSpPr>
-                  <p:cNvPr id="191" name="Straight Connector 190">
-                    <a:extLst>
-                      <a:ext uri="{FF2B5EF4-FFF2-40B4-BE49-F238E27FC236}">
-                        <a16:creationId xmlns:a16="http://schemas.microsoft.com/office/drawing/2014/main" id="{F9E48F50-3CD8-437C-9225-C4A8D2F2476C}"/>
-                      </a:ext>
-                    </a:extLst>
-                  </p:cNvPr>
-                  <p:cNvCxnSpPr/>
-                  <p:nvPr/>
-                </p:nvCxnSpPr>
-                <p:spPr>
-                  <a:xfrm>
-                    <a:off x="6121756" y="983193"/>
-                    <a:ext cx="0" cy="343062"/>
-                  </a:xfrm>
-                  <a:prstGeom prst="line">
-                    <a:avLst/>
-                  </a:prstGeom>
-                </p:spPr>
-                <p:style>
-                  <a:lnRef idx="2">
-                    <a:schemeClr val="dk1"/>
-                  </a:lnRef>
-                  <a:fillRef idx="0">
-                    <a:schemeClr val="dk1"/>
-                  </a:fillRef>
-                  <a:effectRef idx="1">
-                    <a:schemeClr val="dk1"/>
-                  </a:effectRef>
-                  <a:fontRef idx="minor">
-                    <a:schemeClr val="tx1"/>
-                  </a:fontRef>
-                </p:style>
-              </p:cxnSp>
-              <p:cxnSp>
-                <p:nvCxnSpPr>
-                  <p:cNvPr id="192" name="Straight Connector 191">
-                    <a:extLst>
-                      <a:ext uri="{FF2B5EF4-FFF2-40B4-BE49-F238E27FC236}">
-                        <a16:creationId xmlns:a16="http://schemas.microsoft.com/office/drawing/2014/main" id="{11FA276B-ADBC-BA7D-3339-3F6D72CE533B}"/>
-                      </a:ext>
-                    </a:extLst>
-                  </p:cNvPr>
-                  <p:cNvCxnSpPr/>
-                  <p:nvPr/>
-                </p:nvCxnSpPr>
-                <p:spPr>
-                  <a:xfrm>
-                    <a:off x="3314161" y="983193"/>
                     <a:ext cx="2807595" cy="0"/>
                   </a:xfrm>
                   <a:prstGeom prst="line">
@@ -4084,70 +4580,214 @@
                   </a:fontRef>
                 </p:style>
               </p:cxnSp>
+              <p:grpSp>
+                <p:nvGrpSpPr>
+                  <p:cNvPr id="187" name="Group 186">
+                    <a:extLst>
+                      <a:ext uri="{FF2B5EF4-FFF2-40B4-BE49-F238E27FC236}">
+                        <a16:creationId xmlns:a16="http://schemas.microsoft.com/office/drawing/2014/main" id="{0E48CBE7-28DD-3996-E9FD-48617922D45D}"/>
+                      </a:ext>
+                    </a:extLst>
+                  </p:cNvPr>
+                  <p:cNvGrpSpPr/>
+                  <p:nvPr/>
+                </p:nvGrpSpPr>
+                <p:grpSpPr>
+                  <a:xfrm>
+                    <a:off x="238255" y="983193"/>
+                    <a:ext cx="5883501" cy="343062"/>
+                    <a:chOff x="238255" y="983193"/>
+                    <a:chExt cx="5883501" cy="343062"/>
+                  </a:xfrm>
+                </p:grpSpPr>
+                <p:cxnSp>
+                  <p:nvCxnSpPr>
+                    <p:cNvPr id="188" name="Straight Connector 187">
+                      <a:extLst>
+                        <a:ext uri="{FF2B5EF4-FFF2-40B4-BE49-F238E27FC236}">
+                          <a16:creationId xmlns:a16="http://schemas.microsoft.com/office/drawing/2014/main" id="{894C9A55-7122-94DB-B627-BFCC96BF4DFD}"/>
+                        </a:ext>
+                      </a:extLst>
+                    </p:cNvPr>
+                    <p:cNvCxnSpPr/>
+                    <p:nvPr/>
+                  </p:nvCxnSpPr>
+                  <p:spPr>
+                    <a:xfrm>
+                      <a:off x="238255" y="983193"/>
+                      <a:ext cx="0" cy="343062"/>
+                    </a:xfrm>
+                    <a:prstGeom prst="line">
+                      <a:avLst/>
+                    </a:prstGeom>
+                  </p:spPr>
+                  <p:style>
+                    <a:lnRef idx="2">
+                      <a:schemeClr val="dk1"/>
+                    </a:lnRef>
+                    <a:fillRef idx="0">
+                      <a:schemeClr val="dk1"/>
+                    </a:fillRef>
+                    <a:effectRef idx="1">
+                      <a:schemeClr val="dk1"/>
+                    </a:effectRef>
+                    <a:fontRef idx="minor">
+                      <a:schemeClr val="tx1"/>
+                    </a:fontRef>
+                  </p:style>
+                </p:cxnSp>
+                <p:cxnSp>
+                  <p:nvCxnSpPr>
+                    <p:cNvPr id="189" name="Straight Connector 188">
+                      <a:extLst>
+                        <a:ext uri="{FF2B5EF4-FFF2-40B4-BE49-F238E27FC236}">
+                          <a16:creationId xmlns:a16="http://schemas.microsoft.com/office/drawing/2014/main" id="{CD66530D-B9B6-9952-4018-D6D291BE4CCB}"/>
+                        </a:ext>
+                      </a:extLst>
+                    </p:cNvPr>
+                    <p:cNvCxnSpPr/>
+                    <p:nvPr/>
+                  </p:nvCxnSpPr>
+                  <p:spPr>
+                    <a:xfrm>
+                      <a:off x="3045850" y="983193"/>
+                      <a:ext cx="0" cy="343062"/>
+                    </a:xfrm>
+                    <a:prstGeom prst="line">
+                      <a:avLst/>
+                    </a:prstGeom>
+                  </p:spPr>
+                  <p:style>
+                    <a:lnRef idx="2">
+                      <a:schemeClr val="dk1"/>
+                    </a:lnRef>
+                    <a:fillRef idx="0">
+                      <a:schemeClr val="dk1"/>
+                    </a:fillRef>
+                    <a:effectRef idx="1">
+                      <a:schemeClr val="dk1"/>
+                    </a:effectRef>
+                    <a:fontRef idx="minor">
+                      <a:schemeClr val="tx1"/>
+                    </a:fontRef>
+                  </p:style>
+                </p:cxnSp>
+                <p:cxnSp>
+                  <p:nvCxnSpPr>
+                    <p:cNvPr id="190" name="Straight Connector 189">
+                      <a:extLst>
+                        <a:ext uri="{FF2B5EF4-FFF2-40B4-BE49-F238E27FC236}">
+                          <a16:creationId xmlns:a16="http://schemas.microsoft.com/office/drawing/2014/main" id="{20E9C813-2585-3092-315E-264E8C843F66}"/>
+                        </a:ext>
+                      </a:extLst>
+                    </p:cNvPr>
+                    <p:cNvCxnSpPr/>
+                    <p:nvPr/>
+                  </p:nvCxnSpPr>
+                  <p:spPr>
+                    <a:xfrm>
+                      <a:off x="3314161" y="983193"/>
+                      <a:ext cx="0" cy="343062"/>
+                    </a:xfrm>
+                    <a:prstGeom prst="line">
+                      <a:avLst/>
+                    </a:prstGeom>
+                  </p:spPr>
+                  <p:style>
+                    <a:lnRef idx="2">
+                      <a:schemeClr val="dk1"/>
+                    </a:lnRef>
+                    <a:fillRef idx="0">
+                      <a:schemeClr val="dk1"/>
+                    </a:fillRef>
+                    <a:effectRef idx="1">
+                      <a:schemeClr val="dk1"/>
+                    </a:effectRef>
+                    <a:fontRef idx="minor">
+                      <a:schemeClr val="tx1"/>
+                    </a:fontRef>
+                  </p:style>
+                </p:cxnSp>
+                <p:cxnSp>
+                  <p:nvCxnSpPr>
+                    <p:cNvPr id="191" name="Straight Connector 190">
+                      <a:extLst>
+                        <a:ext uri="{FF2B5EF4-FFF2-40B4-BE49-F238E27FC236}">
+                          <a16:creationId xmlns:a16="http://schemas.microsoft.com/office/drawing/2014/main" id="{F9E48F50-3CD8-437C-9225-C4A8D2F2476C}"/>
+                        </a:ext>
+                      </a:extLst>
+                    </p:cNvPr>
+                    <p:cNvCxnSpPr/>
+                    <p:nvPr/>
+                  </p:nvCxnSpPr>
+                  <p:spPr>
+                    <a:xfrm>
+                      <a:off x="6121756" y="983193"/>
+                      <a:ext cx="0" cy="343062"/>
+                    </a:xfrm>
+                    <a:prstGeom prst="line">
+                      <a:avLst/>
+                    </a:prstGeom>
+                  </p:spPr>
+                  <p:style>
+                    <a:lnRef idx="2">
+                      <a:schemeClr val="dk1"/>
+                    </a:lnRef>
+                    <a:fillRef idx="0">
+                      <a:schemeClr val="dk1"/>
+                    </a:fillRef>
+                    <a:effectRef idx="1">
+                      <a:schemeClr val="dk1"/>
+                    </a:effectRef>
+                    <a:fontRef idx="minor">
+                      <a:schemeClr val="tx1"/>
+                    </a:fontRef>
+                  </p:style>
+                </p:cxnSp>
+                <p:cxnSp>
+                  <p:nvCxnSpPr>
+                    <p:cNvPr id="192" name="Straight Connector 191">
+                      <a:extLst>
+                        <a:ext uri="{FF2B5EF4-FFF2-40B4-BE49-F238E27FC236}">
+                          <a16:creationId xmlns:a16="http://schemas.microsoft.com/office/drawing/2014/main" id="{11FA276B-ADBC-BA7D-3339-3F6D72CE533B}"/>
+                        </a:ext>
+                      </a:extLst>
+                    </p:cNvPr>
+                    <p:cNvCxnSpPr/>
+                    <p:nvPr/>
+                  </p:nvCxnSpPr>
+                  <p:spPr>
+                    <a:xfrm>
+                      <a:off x="3314161" y="983193"/>
+                      <a:ext cx="2807595" cy="0"/>
+                    </a:xfrm>
+                    <a:prstGeom prst="line">
+                      <a:avLst/>
+                    </a:prstGeom>
+                  </p:spPr>
+                  <p:style>
+                    <a:lnRef idx="2">
+                      <a:schemeClr val="dk1"/>
+                    </a:lnRef>
+                    <a:fillRef idx="0">
+                      <a:schemeClr val="dk1"/>
+                    </a:fillRef>
+                    <a:effectRef idx="1">
+                      <a:schemeClr val="dk1"/>
+                    </a:effectRef>
+                    <a:fontRef idx="minor">
+                      <a:schemeClr val="tx1"/>
+                    </a:fontRef>
+                  </p:style>
+                </p:cxnSp>
+              </p:grpSp>
             </p:grpSp>
-          </p:grpSp>
-          <p:grpSp>
-            <p:nvGrpSpPr>
-              <p:cNvPr id="174" name="Group 173">
-                <a:extLst>
-                  <a:ext uri="{FF2B5EF4-FFF2-40B4-BE49-F238E27FC236}">
-                    <a16:creationId xmlns:a16="http://schemas.microsoft.com/office/drawing/2014/main" id="{BAE06BA9-E31B-CAE9-E2AE-8D2BEDCC8F2B}"/>
-                  </a:ext>
-                </a:extLst>
-              </p:cNvPr>
-              <p:cNvGrpSpPr/>
-              <p:nvPr/>
-            </p:nvGrpSpPr>
-            <p:grpSpPr>
-              <a:xfrm>
-                <a:off x="6424407" y="983193"/>
-                <a:ext cx="5883501" cy="343062"/>
-                <a:chOff x="238255" y="983193"/>
-                <a:chExt cx="5883501" cy="343062"/>
-              </a:xfrm>
-            </p:grpSpPr>
-            <p:cxnSp>
-              <p:nvCxnSpPr>
-                <p:cNvPr id="179" name="Straight Connector 178">
+            <p:grpSp>
+              <p:nvGrpSpPr>
+                <p:cNvPr id="174" name="Group 173">
                   <a:extLst>
                     <a:ext uri="{FF2B5EF4-FFF2-40B4-BE49-F238E27FC236}">
-                      <a16:creationId xmlns:a16="http://schemas.microsoft.com/office/drawing/2014/main" id="{EA926576-B469-ED55-6113-912235919604}"/>
-                    </a:ext>
-                  </a:extLst>
-                </p:cNvPr>
-                <p:cNvCxnSpPr/>
-                <p:nvPr/>
-              </p:nvCxnSpPr>
-              <p:spPr>
-                <a:xfrm>
-                  <a:off x="238255" y="983193"/>
-                  <a:ext cx="2807595" cy="0"/>
-                </a:xfrm>
-                <a:prstGeom prst="line">
-                  <a:avLst/>
-                </a:prstGeom>
-              </p:spPr>
-              <p:style>
-                <a:lnRef idx="2">
-                  <a:schemeClr val="dk1"/>
-                </a:lnRef>
-                <a:fillRef idx="0">
-                  <a:schemeClr val="dk1"/>
-                </a:fillRef>
-                <a:effectRef idx="1">
-                  <a:schemeClr val="dk1"/>
-                </a:effectRef>
-                <a:fontRef idx="minor">
-                  <a:schemeClr val="tx1"/>
-                </a:fontRef>
-              </p:style>
-            </p:cxnSp>
-            <p:grpSp>
-              <p:nvGrpSpPr>
-                <p:cNvPr id="180" name="Group 179">
-                  <a:extLst>
-                    <a:ext uri="{FF2B5EF4-FFF2-40B4-BE49-F238E27FC236}">
-                      <a16:creationId xmlns:a16="http://schemas.microsoft.com/office/drawing/2014/main" id="{7BAD018B-231F-8891-28AB-B5D248D1F820}"/>
+                      <a16:creationId xmlns:a16="http://schemas.microsoft.com/office/drawing/2014/main" id="{BAE06BA9-E31B-CAE9-E2AE-8D2BEDCC8F2B}"/>
                     </a:ext>
                   </a:extLst>
                 </p:cNvPr>
@@ -4156,7 +4796,7 @@
               </p:nvGrpSpPr>
               <p:grpSpPr>
                 <a:xfrm>
-                  <a:off x="238255" y="983193"/>
+                  <a:off x="6424407" y="983193"/>
                   <a:ext cx="5883501" cy="343062"/>
                   <a:chOff x="238255" y="983193"/>
                   <a:chExt cx="5883501" cy="343062"/>
@@ -4164,10 +4804,10 @@
               </p:grpSpPr>
               <p:cxnSp>
                 <p:nvCxnSpPr>
-                  <p:cNvPr id="181" name="Straight Connector 180">
+                  <p:cNvPr id="179" name="Straight Connector 178">
                     <a:extLst>
                       <a:ext uri="{FF2B5EF4-FFF2-40B4-BE49-F238E27FC236}">
-                        <a16:creationId xmlns:a16="http://schemas.microsoft.com/office/drawing/2014/main" id="{FA8CE078-23F2-AA73-46E9-D77161EA196E}"/>
+                        <a16:creationId xmlns:a16="http://schemas.microsoft.com/office/drawing/2014/main" id="{EA926576-B469-ED55-6113-912235919604}"/>
                       </a:ext>
                     </a:extLst>
                   </p:cNvPr>
@@ -4177,150 +4817,6 @@
                 <p:spPr>
                   <a:xfrm>
                     <a:off x="238255" y="983193"/>
-                    <a:ext cx="0" cy="343062"/>
-                  </a:xfrm>
-                  <a:prstGeom prst="line">
-                    <a:avLst/>
-                  </a:prstGeom>
-                </p:spPr>
-                <p:style>
-                  <a:lnRef idx="2">
-                    <a:schemeClr val="dk1"/>
-                  </a:lnRef>
-                  <a:fillRef idx="0">
-                    <a:schemeClr val="dk1"/>
-                  </a:fillRef>
-                  <a:effectRef idx="1">
-                    <a:schemeClr val="dk1"/>
-                  </a:effectRef>
-                  <a:fontRef idx="minor">
-                    <a:schemeClr val="tx1"/>
-                  </a:fontRef>
-                </p:style>
-              </p:cxnSp>
-              <p:cxnSp>
-                <p:nvCxnSpPr>
-                  <p:cNvPr id="182" name="Straight Connector 181">
-                    <a:extLst>
-                      <a:ext uri="{FF2B5EF4-FFF2-40B4-BE49-F238E27FC236}">
-                        <a16:creationId xmlns:a16="http://schemas.microsoft.com/office/drawing/2014/main" id="{8F96963A-B0DC-13C0-2AA4-DC0BFA1333F8}"/>
-                      </a:ext>
-                    </a:extLst>
-                  </p:cNvPr>
-                  <p:cNvCxnSpPr/>
-                  <p:nvPr/>
-                </p:nvCxnSpPr>
-                <p:spPr>
-                  <a:xfrm>
-                    <a:off x="3045850" y="983193"/>
-                    <a:ext cx="0" cy="343062"/>
-                  </a:xfrm>
-                  <a:prstGeom prst="line">
-                    <a:avLst/>
-                  </a:prstGeom>
-                </p:spPr>
-                <p:style>
-                  <a:lnRef idx="2">
-                    <a:schemeClr val="dk1"/>
-                  </a:lnRef>
-                  <a:fillRef idx="0">
-                    <a:schemeClr val="dk1"/>
-                  </a:fillRef>
-                  <a:effectRef idx="1">
-                    <a:schemeClr val="dk1"/>
-                  </a:effectRef>
-                  <a:fontRef idx="minor">
-                    <a:schemeClr val="tx1"/>
-                  </a:fontRef>
-                </p:style>
-              </p:cxnSp>
-              <p:cxnSp>
-                <p:nvCxnSpPr>
-                  <p:cNvPr id="183" name="Straight Connector 182">
-                    <a:extLst>
-                      <a:ext uri="{FF2B5EF4-FFF2-40B4-BE49-F238E27FC236}">
-                        <a16:creationId xmlns:a16="http://schemas.microsoft.com/office/drawing/2014/main" id="{6DD69843-CDA2-4EA3-8B1E-0F4469BA6A49}"/>
-                      </a:ext>
-                    </a:extLst>
-                  </p:cNvPr>
-                  <p:cNvCxnSpPr/>
-                  <p:nvPr/>
-                </p:nvCxnSpPr>
-                <p:spPr>
-                  <a:xfrm>
-                    <a:off x="3314161" y="983193"/>
-                    <a:ext cx="0" cy="343062"/>
-                  </a:xfrm>
-                  <a:prstGeom prst="line">
-                    <a:avLst/>
-                  </a:prstGeom>
-                </p:spPr>
-                <p:style>
-                  <a:lnRef idx="2">
-                    <a:schemeClr val="dk1"/>
-                  </a:lnRef>
-                  <a:fillRef idx="0">
-                    <a:schemeClr val="dk1"/>
-                  </a:fillRef>
-                  <a:effectRef idx="1">
-                    <a:schemeClr val="dk1"/>
-                  </a:effectRef>
-                  <a:fontRef idx="minor">
-                    <a:schemeClr val="tx1"/>
-                  </a:fontRef>
-                </p:style>
-              </p:cxnSp>
-              <p:cxnSp>
-                <p:nvCxnSpPr>
-                  <p:cNvPr id="184" name="Straight Connector 183">
-                    <a:extLst>
-                      <a:ext uri="{FF2B5EF4-FFF2-40B4-BE49-F238E27FC236}">
-                        <a16:creationId xmlns:a16="http://schemas.microsoft.com/office/drawing/2014/main" id="{F63C593A-E5F4-1D62-311B-10390A53AF23}"/>
-                      </a:ext>
-                    </a:extLst>
-                  </p:cNvPr>
-                  <p:cNvCxnSpPr/>
-                  <p:nvPr/>
-                </p:nvCxnSpPr>
-                <p:spPr>
-                  <a:xfrm>
-                    <a:off x="6121756" y="983193"/>
-                    <a:ext cx="0" cy="343062"/>
-                  </a:xfrm>
-                  <a:prstGeom prst="line">
-                    <a:avLst/>
-                  </a:prstGeom>
-                </p:spPr>
-                <p:style>
-                  <a:lnRef idx="2">
-                    <a:schemeClr val="dk1"/>
-                  </a:lnRef>
-                  <a:fillRef idx="0">
-                    <a:schemeClr val="dk1"/>
-                  </a:fillRef>
-                  <a:effectRef idx="1">
-                    <a:schemeClr val="dk1"/>
-                  </a:effectRef>
-                  <a:fontRef idx="minor">
-                    <a:schemeClr val="tx1"/>
-                  </a:fontRef>
-                </p:style>
-              </p:cxnSp>
-              <p:cxnSp>
-                <p:nvCxnSpPr>
-                  <p:cNvPr id="185" name="Straight Connector 184">
-                    <a:extLst>
-                      <a:ext uri="{FF2B5EF4-FFF2-40B4-BE49-F238E27FC236}">
-                        <a16:creationId xmlns:a16="http://schemas.microsoft.com/office/drawing/2014/main" id="{7970291B-1CEF-10A3-DB48-5FB9FBF084EE}"/>
-                      </a:ext>
-                    </a:extLst>
-                  </p:cNvPr>
-                  <p:cNvCxnSpPr/>
-                  <p:nvPr/>
-                </p:nvCxnSpPr>
-                <p:spPr>
-                  <a:xfrm>
-                    <a:off x="3314161" y="983193"/>
                     <a:ext cx="2807595" cy="0"/>
                   </a:xfrm>
                   <a:prstGeom prst="line">
@@ -4342,228 +4838,423 @@
                   </a:fontRef>
                 </p:style>
               </p:cxnSp>
+              <p:grpSp>
+                <p:nvGrpSpPr>
+                  <p:cNvPr id="180" name="Group 179">
+                    <a:extLst>
+                      <a:ext uri="{FF2B5EF4-FFF2-40B4-BE49-F238E27FC236}">
+                        <a16:creationId xmlns:a16="http://schemas.microsoft.com/office/drawing/2014/main" id="{7BAD018B-231F-8891-28AB-B5D248D1F820}"/>
+                      </a:ext>
+                    </a:extLst>
+                  </p:cNvPr>
+                  <p:cNvGrpSpPr/>
+                  <p:nvPr/>
+                </p:nvGrpSpPr>
+                <p:grpSpPr>
+                  <a:xfrm>
+                    <a:off x="238255" y="983193"/>
+                    <a:ext cx="5883501" cy="343062"/>
+                    <a:chOff x="238255" y="983193"/>
+                    <a:chExt cx="5883501" cy="343062"/>
+                  </a:xfrm>
+                </p:grpSpPr>
+                <p:cxnSp>
+                  <p:nvCxnSpPr>
+                    <p:cNvPr id="181" name="Straight Connector 180">
+                      <a:extLst>
+                        <a:ext uri="{FF2B5EF4-FFF2-40B4-BE49-F238E27FC236}">
+                          <a16:creationId xmlns:a16="http://schemas.microsoft.com/office/drawing/2014/main" id="{FA8CE078-23F2-AA73-46E9-D77161EA196E}"/>
+                        </a:ext>
+                      </a:extLst>
+                    </p:cNvPr>
+                    <p:cNvCxnSpPr/>
+                    <p:nvPr/>
+                  </p:nvCxnSpPr>
+                  <p:spPr>
+                    <a:xfrm>
+                      <a:off x="238255" y="983193"/>
+                      <a:ext cx="0" cy="343062"/>
+                    </a:xfrm>
+                    <a:prstGeom prst="line">
+                      <a:avLst/>
+                    </a:prstGeom>
+                  </p:spPr>
+                  <p:style>
+                    <a:lnRef idx="2">
+                      <a:schemeClr val="dk1"/>
+                    </a:lnRef>
+                    <a:fillRef idx="0">
+                      <a:schemeClr val="dk1"/>
+                    </a:fillRef>
+                    <a:effectRef idx="1">
+                      <a:schemeClr val="dk1"/>
+                    </a:effectRef>
+                    <a:fontRef idx="minor">
+                      <a:schemeClr val="tx1"/>
+                    </a:fontRef>
+                  </p:style>
+                </p:cxnSp>
+                <p:cxnSp>
+                  <p:nvCxnSpPr>
+                    <p:cNvPr id="182" name="Straight Connector 181">
+                      <a:extLst>
+                        <a:ext uri="{FF2B5EF4-FFF2-40B4-BE49-F238E27FC236}">
+                          <a16:creationId xmlns:a16="http://schemas.microsoft.com/office/drawing/2014/main" id="{8F96963A-B0DC-13C0-2AA4-DC0BFA1333F8}"/>
+                        </a:ext>
+                      </a:extLst>
+                    </p:cNvPr>
+                    <p:cNvCxnSpPr/>
+                    <p:nvPr/>
+                  </p:nvCxnSpPr>
+                  <p:spPr>
+                    <a:xfrm>
+                      <a:off x="3045850" y="983193"/>
+                      <a:ext cx="0" cy="343062"/>
+                    </a:xfrm>
+                    <a:prstGeom prst="line">
+                      <a:avLst/>
+                    </a:prstGeom>
+                  </p:spPr>
+                  <p:style>
+                    <a:lnRef idx="2">
+                      <a:schemeClr val="dk1"/>
+                    </a:lnRef>
+                    <a:fillRef idx="0">
+                      <a:schemeClr val="dk1"/>
+                    </a:fillRef>
+                    <a:effectRef idx="1">
+                      <a:schemeClr val="dk1"/>
+                    </a:effectRef>
+                    <a:fontRef idx="minor">
+                      <a:schemeClr val="tx1"/>
+                    </a:fontRef>
+                  </p:style>
+                </p:cxnSp>
+                <p:cxnSp>
+                  <p:nvCxnSpPr>
+                    <p:cNvPr id="183" name="Straight Connector 182">
+                      <a:extLst>
+                        <a:ext uri="{FF2B5EF4-FFF2-40B4-BE49-F238E27FC236}">
+                          <a16:creationId xmlns:a16="http://schemas.microsoft.com/office/drawing/2014/main" id="{6DD69843-CDA2-4EA3-8B1E-0F4469BA6A49}"/>
+                        </a:ext>
+                      </a:extLst>
+                    </p:cNvPr>
+                    <p:cNvCxnSpPr/>
+                    <p:nvPr/>
+                  </p:nvCxnSpPr>
+                  <p:spPr>
+                    <a:xfrm>
+                      <a:off x="3314161" y="983193"/>
+                      <a:ext cx="0" cy="343062"/>
+                    </a:xfrm>
+                    <a:prstGeom prst="line">
+                      <a:avLst/>
+                    </a:prstGeom>
+                  </p:spPr>
+                  <p:style>
+                    <a:lnRef idx="2">
+                      <a:schemeClr val="dk1"/>
+                    </a:lnRef>
+                    <a:fillRef idx="0">
+                      <a:schemeClr val="dk1"/>
+                    </a:fillRef>
+                    <a:effectRef idx="1">
+                      <a:schemeClr val="dk1"/>
+                    </a:effectRef>
+                    <a:fontRef idx="minor">
+                      <a:schemeClr val="tx1"/>
+                    </a:fontRef>
+                  </p:style>
+                </p:cxnSp>
+                <p:cxnSp>
+                  <p:nvCxnSpPr>
+                    <p:cNvPr id="184" name="Straight Connector 183">
+                      <a:extLst>
+                        <a:ext uri="{FF2B5EF4-FFF2-40B4-BE49-F238E27FC236}">
+                          <a16:creationId xmlns:a16="http://schemas.microsoft.com/office/drawing/2014/main" id="{F63C593A-E5F4-1D62-311B-10390A53AF23}"/>
+                        </a:ext>
+                      </a:extLst>
+                    </p:cNvPr>
+                    <p:cNvCxnSpPr/>
+                    <p:nvPr/>
+                  </p:nvCxnSpPr>
+                  <p:spPr>
+                    <a:xfrm>
+                      <a:off x="6121756" y="983193"/>
+                      <a:ext cx="0" cy="343062"/>
+                    </a:xfrm>
+                    <a:prstGeom prst="line">
+                      <a:avLst/>
+                    </a:prstGeom>
+                  </p:spPr>
+                  <p:style>
+                    <a:lnRef idx="2">
+                      <a:schemeClr val="dk1"/>
+                    </a:lnRef>
+                    <a:fillRef idx="0">
+                      <a:schemeClr val="dk1"/>
+                    </a:fillRef>
+                    <a:effectRef idx="1">
+                      <a:schemeClr val="dk1"/>
+                    </a:effectRef>
+                    <a:fontRef idx="minor">
+                      <a:schemeClr val="tx1"/>
+                    </a:fontRef>
+                  </p:style>
+                </p:cxnSp>
+                <p:cxnSp>
+                  <p:nvCxnSpPr>
+                    <p:cNvPr id="185" name="Straight Connector 184">
+                      <a:extLst>
+                        <a:ext uri="{FF2B5EF4-FFF2-40B4-BE49-F238E27FC236}">
+                          <a16:creationId xmlns:a16="http://schemas.microsoft.com/office/drawing/2014/main" id="{7970291B-1CEF-10A3-DB48-5FB9FBF084EE}"/>
+                        </a:ext>
+                      </a:extLst>
+                    </p:cNvPr>
+                    <p:cNvCxnSpPr/>
+                    <p:nvPr/>
+                  </p:nvCxnSpPr>
+                  <p:spPr>
+                    <a:xfrm>
+                      <a:off x="3314161" y="983193"/>
+                      <a:ext cx="2807595" cy="0"/>
+                    </a:xfrm>
+                    <a:prstGeom prst="line">
+                      <a:avLst/>
+                    </a:prstGeom>
+                  </p:spPr>
+                  <p:style>
+                    <a:lnRef idx="2">
+                      <a:schemeClr val="dk1"/>
+                    </a:lnRef>
+                    <a:fillRef idx="0">
+                      <a:schemeClr val="dk1"/>
+                    </a:fillRef>
+                    <a:effectRef idx="1">
+                      <a:schemeClr val="dk1"/>
+                    </a:effectRef>
+                    <a:fontRef idx="minor">
+                      <a:schemeClr val="tx1"/>
+                    </a:fontRef>
+                  </p:style>
+                </p:cxnSp>
+              </p:grpSp>
             </p:grpSp>
+            <p:sp>
+              <p:nvSpPr>
+                <p:cNvPr id="175" name="TextBox 174">
+                  <a:extLst>
+                    <a:ext uri="{FF2B5EF4-FFF2-40B4-BE49-F238E27FC236}">
+                      <a16:creationId xmlns:a16="http://schemas.microsoft.com/office/drawing/2014/main" id="{8EA8E13E-C71C-688A-598A-CA2473CE94C1}"/>
+                    </a:ext>
+                  </a:extLst>
+                </p:cNvPr>
+                <p:cNvSpPr txBox="1"/>
+                <p:nvPr/>
+              </p:nvSpPr>
+              <p:spPr>
+                <a:xfrm>
+                  <a:off x="837184" y="600726"/>
+                  <a:ext cx="1658787" cy="369332"/>
+                </a:xfrm>
+                <a:prstGeom prst="rect">
+                  <a:avLst/>
+                </a:prstGeom>
+                <a:noFill/>
+              </p:spPr>
+              <p:txBody>
+                <a:bodyPr wrap="none" rtlCol="0">
+                  <a:spAutoFit/>
+                </a:bodyPr>
+                <a:lstStyle/>
+                <a:p>
+                  <a:r>
+                    <a:rPr lang="en-US" dirty="0"/>
+                    <a:t>↑↑ DES 70min</a:t>
+                  </a:r>
+                </a:p>
+              </p:txBody>
+            </p:sp>
+            <p:sp>
+              <p:nvSpPr>
+                <p:cNvPr id="176" name="TextBox 175">
+                  <a:extLst>
+                    <a:ext uri="{FF2B5EF4-FFF2-40B4-BE49-F238E27FC236}">
+                      <a16:creationId xmlns:a16="http://schemas.microsoft.com/office/drawing/2014/main" id="{916D6B3D-F047-D814-5F1E-B460A371E3EE}"/>
+                    </a:ext>
+                  </a:extLst>
+                </p:cNvPr>
+                <p:cNvSpPr txBox="1"/>
+                <p:nvPr/>
+              </p:nvSpPr>
+              <p:spPr>
+                <a:xfrm>
+                  <a:off x="7063720" y="600442"/>
+                  <a:ext cx="1554593" cy="369332"/>
+                </a:xfrm>
+                <a:prstGeom prst="rect">
+                  <a:avLst/>
+                </a:prstGeom>
+                <a:noFill/>
+              </p:spPr>
+              <p:txBody>
+                <a:bodyPr wrap="none" rtlCol="0">
+                  <a:spAutoFit/>
+                </a:bodyPr>
+                <a:lstStyle/>
+                <a:p>
+                  <a:r>
+                    <a:rPr lang="en-US" dirty="0"/>
+                    <a:t>↑↑ DES 25hr </a:t>
+                  </a:r>
+                </a:p>
+              </p:txBody>
+            </p:sp>
+            <p:sp>
+              <p:nvSpPr>
+                <p:cNvPr id="177" name="TextBox 176">
+                  <a:extLst>
+                    <a:ext uri="{FF2B5EF4-FFF2-40B4-BE49-F238E27FC236}">
+                      <a16:creationId xmlns:a16="http://schemas.microsoft.com/office/drawing/2014/main" id="{C9A7B1DF-4E15-0538-8547-D9EF9EA42949}"/>
+                    </a:ext>
+                  </a:extLst>
+                </p:cNvPr>
+                <p:cNvSpPr txBox="1"/>
+                <p:nvPr/>
+              </p:nvSpPr>
+              <p:spPr>
+                <a:xfrm>
+                  <a:off x="3950452" y="600442"/>
+                  <a:ext cx="1662635" cy="369332"/>
+                </a:xfrm>
+                <a:prstGeom prst="rect">
+                  <a:avLst/>
+                </a:prstGeom>
+                <a:noFill/>
+              </p:spPr>
+              <p:txBody>
+                <a:bodyPr wrap="square" rtlCol="0">
+                  <a:spAutoFit/>
+                </a:bodyPr>
+                <a:lstStyle/>
+                <a:p>
+                  <a:r>
+                    <a:rPr lang="en-US" dirty="0"/>
+                    <a:t>↓↓ DES 70min</a:t>
+                  </a:r>
+                </a:p>
+              </p:txBody>
+            </p:sp>
+            <p:sp>
+              <p:nvSpPr>
+                <p:cNvPr id="178" name="TextBox 177">
+                  <a:extLst>
+                    <a:ext uri="{FF2B5EF4-FFF2-40B4-BE49-F238E27FC236}">
+                      <a16:creationId xmlns:a16="http://schemas.microsoft.com/office/drawing/2014/main" id="{A1673843-B946-2EF6-8FBE-F3CD9C0AB463}"/>
+                    </a:ext>
+                  </a:extLst>
+                </p:cNvPr>
+                <p:cNvSpPr txBox="1"/>
+                <p:nvPr/>
+              </p:nvSpPr>
+              <p:spPr>
+                <a:xfrm>
+                  <a:off x="10072792" y="600442"/>
+                  <a:ext cx="1662635" cy="369332"/>
+                </a:xfrm>
+                <a:prstGeom prst="rect">
+                  <a:avLst/>
+                </a:prstGeom>
+                <a:noFill/>
+              </p:spPr>
+              <p:txBody>
+                <a:bodyPr wrap="square" rtlCol="0">
+                  <a:spAutoFit/>
+                </a:bodyPr>
+                <a:lstStyle/>
+                <a:p>
+                  <a:r>
+                    <a:rPr lang="en-US" dirty="0"/>
+                    <a:t>↓↓ DES 25 </a:t>
+                  </a:r>
+                  <a:r>
+                    <a:rPr lang="en-US" dirty="0" err="1"/>
+                    <a:t>hr</a:t>
+                  </a:r>
+                  <a:r>
+                    <a:rPr lang="en-US" dirty="0"/>
+                    <a:t> </a:t>
+                  </a:r>
+                </a:p>
+              </p:txBody>
+            </p:sp>
           </p:grpSp>
-          <p:sp>
-            <p:nvSpPr>
-              <p:cNvPr id="175" name="TextBox 174">
-                <a:extLst>
-                  <a:ext uri="{FF2B5EF4-FFF2-40B4-BE49-F238E27FC236}">
-                    <a16:creationId xmlns:a16="http://schemas.microsoft.com/office/drawing/2014/main" id="{8EA8E13E-C71C-688A-598A-CA2473CE94C1}"/>
-                  </a:ext>
-                </a:extLst>
-              </p:cNvPr>
-              <p:cNvSpPr txBox="1"/>
-              <p:nvPr/>
-            </p:nvSpPr>
-            <p:spPr>
-              <a:xfrm>
-                <a:off x="837184" y="600726"/>
-                <a:ext cx="1658787" cy="369332"/>
-              </a:xfrm>
-              <a:prstGeom prst="rect">
-                <a:avLst/>
-              </a:prstGeom>
-              <a:noFill/>
-            </p:spPr>
-            <p:txBody>
-              <a:bodyPr wrap="none" rtlCol="0">
-                <a:spAutoFit/>
-              </a:bodyPr>
-              <a:lstStyle/>
-              <a:p>
-                <a:r>
-                  <a:rPr lang="en-US" dirty="0"/>
-                  <a:t>↑↑ DES 70min</a:t>
-                </a:r>
-              </a:p>
-            </p:txBody>
-          </p:sp>
-          <p:sp>
-            <p:nvSpPr>
-              <p:cNvPr id="176" name="TextBox 175">
-                <a:extLst>
-                  <a:ext uri="{FF2B5EF4-FFF2-40B4-BE49-F238E27FC236}">
-                    <a16:creationId xmlns:a16="http://schemas.microsoft.com/office/drawing/2014/main" id="{916D6B3D-F047-D814-5F1E-B460A371E3EE}"/>
-                  </a:ext>
-                </a:extLst>
-              </p:cNvPr>
-              <p:cNvSpPr txBox="1"/>
-              <p:nvPr/>
-            </p:nvSpPr>
-            <p:spPr>
-              <a:xfrm>
-                <a:off x="7063720" y="600442"/>
-                <a:ext cx="1554593" cy="369332"/>
-              </a:xfrm>
-              <a:prstGeom prst="rect">
-                <a:avLst/>
-              </a:prstGeom>
-              <a:noFill/>
-            </p:spPr>
-            <p:txBody>
-              <a:bodyPr wrap="none" rtlCol="0">
-                <a:spAutoFit/>
-              </a:bodyPr>
-              <a:lstStyle/>
-              <a:p>
-                <a:r>
-                  <a:rPr lang="en-US" dirty="0"/>
-                  <a:t>↑↑ DES 25hr </a:t>
-                </a:r>
-              </a:p>
-            </p:txBody>
-          </p:sp>
-          <p:sp>
-            <p:nvSpPr>
-              <p:cNvPr id="177" name="TextBox 176">
-                <a:extLst>
-                  <a:ext uri="{FF2B5EF4-FFF2-40B4-BE49-F238E27FC236}">
-                    <a16:creationId xmlns:a16="http://schemas.microsoft.com/office/drawing/2014/main" id="{C9A7B1DF-4E15-0538-8547-D9EF9EA42949}"/>
-                  </a:ext>
-                </a:extLst>
-              </p:cNvPr>
-              <p:cNvSpPr txBox="1"/>
-              <p:nvPr/>
-            </p:nvSpPr>
-            <p:spPr>
-              <a:xfrm>
-                <a:off x="3950452" y="600442"/>
-                <a:ext cx="1662635" cy="369332"/>
-              </a:xfrm>
-              <a:prstGeom prst="rect">
-                <a:avLst/>
-              </a:prstGeom>
-              <a:noFill/>
-            </p:spPr>
-            <p:txBody>
-              <a:bodyPr wrap="square" rtlCol="0">
-                <a:spAutoFit/>
-              </a:bodyPr>
-              <a:lstStyle/>
-              <a:p>
-                <a:r>
-                  <a:rPr lang="en-US" dirty="0"/>
-                  <a:t>↓↓ DES 70min</a:t>
-                </a:r>
-              </a:p>
-            </p:txBody>
-          </p:sp>
-          <p:sp>
-            <p:nvSpPr>
-              <p:cNvPr id="178" name="TextBox 177">
-                <a:extLst>
-                  <a:ext uri="{FF2B5EF4-FFF2-40B4-BE49-F238E27FC236}">
-                    <a16:creationId xmlns:a16="http://schemas.microsoft.com/office/drawing/2014/main" id="{A1673843-B946-2EF6-8FBE-F3CD9C0AB463}"/>
-                  </a:ext>
-                </a:extLst>
-              </p:cNvPr>
-              <p:cNvSpPr txBox="1"/>
-              <p:nvPr/>
-            </p:nvSpPr>
-            <p:spPr>
-              <a:xfrm>
-                <a:off x="10072792" y="600442"/>
-                <a:ext cx="1662635" cy="369332"/>
-              </a:xfrm>
-              <a:prstGeom prst="rect">
-                <a:avLst/>
-              </a:prstGeom>
-              <a:noFill/>
-            </p:spPr>
-            <p:txBody>
-              <a:bodyPr wrap="square" rtlCol="0">
-                <a:spAutoFit/>
-              </a:bodyPr>
-              <a:lstStyle/>
-              <a:p>
-                <a:r>
-                  <a:rPr lang="en-US" dirty="0"/>
-                  <a:t>↓↓ DES 25 </a:t>
-                </a:r>
-                <a:r>
-                  <a:rPr lang="en-US" dirty="0" err="1"/>
-                  <a:t>hr</a:t>
-                </a:r>
-                <a:r>
-                  <a:rPr lang="en-US" dirty="0"/>
-                  <a:t> </a:t>
-                </a:r>
-              </a:p>
-            </p:txBody>
-          </p:sp>
         </p:grpSp>
+        <p:sp>
+          <p:nvSpPr>
+            <p:cNvPr id="196" name="TextBox 195">
+              <a:extLst>
+                <a:ext uri="{FF2B5EF4-FFF2-40B4-BE49-F238E27FC236}">
+                  <a16:creationId xmlns:a16="http://schemas.microsoft.com/office/drawing/2014/main" id="{45A3813A-FA71-9F84-1239-90C3343244E7}"/>
+                </a:ext>
+              </a:extLst>
+            </p:cNvPr>
+            <p:cNvSpPr txBox="1"/>
+            <p:nvPr/>
+          </p:nvSpPr>
+          <p:spPr>
+            <a:xfrm>
+              <a:off x="11222" y="3676262"/>
+              <a:ext cx="444352" cy="461665"/>
+            </a:xfrm>
+            <a:prstGeom prst="rect">
+              <a:avLst/>
+            </a:prstGeom>
+            <a:noFill/>
+          </p:spPr>
+          <p:txBody>
+            <a:bodyPr wrap="none" rtlCol="0">
+              <a:spAutoFit/>
+            </a:bodyPr>
+            <a:lstStyle/>
+            <a:p>
+              <a:r>
+                <a:rPr lang="en-US" sz="2400" dirty="0"/>
+                <a:t>B)</a:t>
+              </a:r>
+            </a:p>
+          </p:txBody>
+        </p:sp>
       </p:grpSp>
-      <p:sp>
-        <p:nvSpPr>
-          <p:cNvPr id="195" name="TextBox 194">
+      <p:pic>
+        <p:nvPicPr>
+          <p:cNvPr id="36" name="Picture 35">
             <a:extLst>
               <a:ext uri="{FF2B5EF4-FFF2-40B4-BE49-F238E27FC236}">
-                <a16:creationId xmlns:a16="http://schemas.microsoft.com/office/drawing/2014/main" id="{6A8B9CB4-8E31-A9DC-FE01-5F6878C3230A}"/>
+                <a16:creationId xmlns:a16="http://schemas.microsoft.com/office/drawing/2014/main" id="{3CDF9158-121F-62E1-7079-3F9100AA0629}"/>
               </a:ext>
             </a:extLst>
           </p:cNvPr>
-          <p:cNvSpPr txBox="1"/>
+          <p:cNvPicPr>
+            <a:picLocks noChangeAspect="1"/>
+          </p:cNvPicPr>
           <p:nvPr/>
-        </p:nvSpPr>
+        </p:nvPicPr>
+        <p:blipFill rotWithShape="1">
+          <a:blip r:embed="rId4"/>
+          <a:srcRect l="95426" t="37448" b="45656"/>
+          <a:stretch/>
+        </p:blipFill>
         <p:spPr>
           <a:xfrm>
-            <a:off x="10468" y="383092"/>
-            <a:ext cx="455574" cy="461665"/>
+            <a:off x="13157956" y="2717437"/>
+            <a:ext cx="738303" cy="1722625"/>
           </a:xfrm>
           <a:prstGeom prst="rect">
             <a:avLst/>
           </a:prstGeom>
-          <a:noFill/>
         </p:spPr>
-        <p:txBody>
-          <a:bodyPr wrap="none" rtlCol="0">
-            <a:spAutoFit/>
-          </a:bodyPr>
-          <a:lstStyle/>
-          <a:p>
-            <a:r>
-              <a:rPr lang="en-US" sz="2400" dirty="0"/>
-              <a:t>A)</a:t>
-            </a:r>
-          </a:p>
-        </p:txBody>
-      </p:sp>
-      <p:sp>
-        <p:nvSpPr>
-          <p:cNvPr id="196" name="TextBox 195">
-            <a:extLst>
-              <a:ext uri="{FF2B5EF4-FFF2-40B4-BE49-F238E27FC236}">
-                <a16:creationId xmlns:a16="http://schemas.microsoft.com/office/drawing/2014/main" id="{45A3813A-FA71-9F84-1239-90C3343244E7}"/>
-              </a:ext>
-            </a:extLst>
-          </p:cNvPr>
-          <p:cNvSpPr txBox="1"/>
-          <p:nvPr/>
-        </p:nvSpPr>
-        <p:spPr>
-          <a:xfrm>
-            <a:off x="10468" y="3747965"/>
-            <a:ext cx="444352" cy="461665"/>
-          </a:xfrm>
-          <a:prstGeom prst="rect">
-            <a:avLst/>
-          </a:prstGeom>
-          <a:noFill/>
-        </p:spPr>
-        <p:txBody>
-          <a:bodyPr wrap="none" rtlCol="0">
-            <a:spAutoFit/>
-          </a:bodyPr>
-          <a:lstStyle/>
-          <a:p>
-            <a:r>
-              <a:rPr lang="en-US" sz="2400" dirty="0"/>
-              <a:t>B)</a:t>
-            </a:r>
-          </a:p>
-        </p:txBody>
-      </p:sp>
+      </p:pic>
     </p:spTree>
     <p:extLst>
       <p:ext uri="{BB962C8B-B14F-4D97-AF65-F5344CB8AC3E}">

</xml_diff>